<commit_message>
Finished GitHub, solo section
</commit_message>
<xml_diff>
--- a/GitHub for Epidemiologists.pptx
+++ b/GitHub for Epidemiologists.pptx
@@ -11362,7 +11362,12 @@
             <p:ph sz="quarter" idx="15"/>
           </p:nvPr>
         </p:nvSpPr>
-        <p:spPr/>
+        <p:spPr>
+          <a:xfrm>
+            <a:off x="499175" y="1693723"/>
+            <a:ext cx="11189905" cy="3533182"/>
+          </a:xfrm>
+        </p:spPr>
         <p:txBody>
           <a:bodyPr/>
           <a:lstStyle/>
@@ -11398,6 +11403,20 @@
             <a:r>
               <a:rPr lang="en-US" dirty="0"/>
               <a:t>: if multiple people are using the same repository, how can I ensure that nobody writes over information already there? </a:t>
+            </a:r>
+          </a:p>
+          <a:p>
+            <a:r>
+              <a:rPr lang="en-US" dirty="0"/>
+              <a:t>There is one of me, hopefully many of you. Copy error message into Google and see if </a:t>
+            </a:r>
+            <a:r>
+              <a:rPr lang="en-US" dirty="0" err="1"/>
+              <a:t>StackOverflow</a:t>
+            </a:r>
+            <a:r>
+              <a:rPr lang="en-US" dirty="0"/>
+              <a:t> already has an answer!!!</a:t>
             </a:r>
           </a:p>
           <a:p>
@@ -12374,6 +12393,13 @@
               </a:rPr>
               <a:t>Chapter 17 in Happy Git with R</a:t>
             </a:r>
+            <a:endParaRPr lang="en-US" dirty="0"/>
+          </a:p>
+          <a:p>
+            <a:r>
+              <a:rPr lang="en-US" dirty="0"/>
+              <a:t>I think this is what most people will use from this workshop. </a:t>
+            </a:r>
             <a:endParaRPr lang="en-US" sz="2400" dirty="0">
               <a:highlight>
                 <a:srgbClr val="C0C0C0"/>
@@ -12407,7 +12433,7 @@
           <a:p>
             <a:r>
               <a:rPr lang="en-US" dirty="0"/>
-              <a:t>Steps</a:t>
+              <a:t>Steps (5 minute exercise)</a:t>
             </a:r>
           </a:p>
         </p:txBody>
@@ -12868,7 +12894,14 @@
           <a:p>
             <a:r>
               <a:rPr lang="en-US" dirty="0"/>
-              <a:t>Use Case 2: New project, starting with GitHub</a:t>
+              <a:t>Use Case 2: New project, starting with GitHub </a:t>
+            </a:r>
+            <a:br>
+              <a:rPr lang="en-US" dirty="0"/>
+            </a:br>
+            <a:r>
+              <a:rPr lang="en-US" dirty="0"/>
+              <a:t>(5 minute exercise)</a:t>
             </a:r>
           </a:p>
         </p:txBody>
@@ -12922,7 +12955,37 @@
           <a:bodyPr/>
           <a:lstStyle/>
           <a:p>
+            <a:r>
+              <a:rPr lang="en-US" dirty="0"/>
+              <a:t>You are asked to do a new analysis, and you think to use GitHub ahead of time. </a:t>
+            </a:r>
+            <a:r>
+              <a:rPr lang="en-US" dirty="0">
+                <a:hlinkClick r:id="rId2"/>
+              </a:rPr>
+              <a:t>Details in Chapter 15!</a:t>
+            </a:r>
             <a:endParaRPr lang="en-US" dirty="0"/>
+          </a:p>
+          <a:p>
+            <a:r>
+              <a:rPr lang="en-US" dirty="0"/>
+              <a:t>Step 1: Create repository on GitHub (point and click!)</a:t>
+            </a:r>
+          </a:p>
+          <a:p>
+            <a:r>
+              <a:rPr lang="en-US" dirty="0"/>
+              <a:t>Step 2: Copy </a:t>
+            </a:r>
+            <a:r>
+              <a:rPr lang="en-US" dirty="0" err="1"/>
+              <a:t>ssh</a:t>
+            </a:r>
+            <a:r>
+              <a:rPr lang="en-US" dirty="0"/>
+              <a:t> link within the green “Code” button</a:t>
+            </a:r>
           </a:p>
         </p:txBody>
       </p:sp>
@@ -12947,7 +13010,106 @@
           <a:bodyPr/>
           <a:lstStyle/>
           <a:p>
-            <a:endParaRPr lang="en-US"/>
+            <a:r>
+              <a:rPr lang="en-US" dirty="0"/>
+              <a:t>Step 3: with </a:t>
+            </a:r>
+            <a:r>
+              <a:rPr lang="en-US" dirty="0" err="1">
+                <a:highlight>
+                  <a:srgbClr val="C0C0C0"/>
+                </a:highlight>
+                <a:latin typeface="Fira Code Retina" panose="020B0809050000020004" pitchFamily="49" charset="0"/>
+                <a:ea typeface="Fira Code Retina" panose="020B0809050000020004" pitchFamily="49" charset="0"/>
+              </a:rPr>
+              <a:t>usethis</a:t>
+            </a:r>
+            <a:r>
+              <a:rPr lang="en-US" dirty="0"/>
+              <a:t>, there is the command </a:t>
+            </a:r>
+            <a:r>
+              <a:rPr lang="en-US" dirty="0" err="1">
+                <a:highlight>
+                  <a:srgbClr val="C0C0C0"/>
+                </a:highlight>
+                <a:latin typeface="Fira Code Retina" panose="020B0809050000020004" pitchFamily="49" charset="0"/>
+                <a:ea typeface="Fira Code Retina" panose="020B0809050000020004" pitchFamily="49" charset="0"/>
+              </a:rPr>
+              <a:t>create_from_github</a:t>
+            </a:r>
+            <a:r>
+              <a:rPr lang="en-US" dirty="0">
+                <a:highlight>
+                  <a:srgbClr val="C0C0C0"/>
+                </a:highlight>
+                <a:latin typeface="Fira Code Retina" panose="020B0809050000020004" pitchFamily="49" charset="0"/>
+                <a:ea typeface="Fira Code Retina" panose="020B0809050000020004" pitchFamily="49" charset="0"/>
+              </a:rPr>
+              <a:t>(</a:t>
+            </a:r>
+            <a:br>
+              <a:rPr lang="en-US" dirty="0">
+                <a:highlight>
+                  <a:srgbClr val="C0C0C0"/>
+                </a:highlight>
+                <a:latin typeface="Fira Code Retina" panose="020B0809050000020004" pitchFamily="49" charset="0"/>
+                <a:ea typeface="Fira Code Retina" panose="020B0809050000020004" pitchFamily="49" charset="0"/>
+              </a:rPr>
+            </a:br>
+            <a:r>
+              <a:rPr lang="en-US" dirty="0">
+                <a:highlight>
+                  <a:srgbClr val="C0C0C0"/>
+                </a:highlight>
+                <a:latin typeface="Fira Code Retina" panose="020B0809050000020004" pitchFamily="49" charset="0"/>
+                <a:ea typeface="Fira Code Retina" panose="020B0809050000020004" pitchFamily="49" charset="0"/>
+              </a:rPr>
+              <a:t>	“&lt;SSH LINK&gt;”, 	</a:t>
+            </a:r>
+            <a:r>
+              <a:rPr lang="en-US" dirty="0" err="1">
+                <a:highlight>
+                  <a:srgbClr val="C0C0C0"/>
+                </a:highlight>
+                <a:latin typeface="Fira Code Retina" panose="020B0809050000020004" pitchFamily="49" charset="0"/>
+                <a:ea typeface="Fira Code Retina" panose="020B0809050000020004" pitchFamily="49" charset="0"/>
+              </a:rPr>
+              <a:t>destdir</a:t>
+            </a:r>
+            <a:r>
+              <a:rPr lang="en-US" dirty="0">
+                <a:highlight>
+                  <a:srgbClr val="C0C0C0"/>
+                </a:highlight>
+                <a:latin typeface="Fira Code Retina" panose="020B0809050000020004" pitchFamily="49" charset="0"/>
+                <a:ea typeface="Fira Code Retina" panose="020B0809050000020004" pitchFamily="49" charset="0"/>
+              </a:rPr>
+              <a:t>=“~/&lt;PATH&gt;”)</a:t>
+            </a:r>
+          </a:p>
+          <a:p>
+            <a:r>
+              <a:rPr lang="en-US" dirty="0"/>
+              <a:t>Alternate Step 3: under File &gt; New Project, there is an option for Version Control. </a:t>
+            </a:r>
+          </a:p>
+          <a:p>
+            <a:r>
+              <a:rPr lang="en-US" dirty="0"/>
+              <a:t>Alternate Step 3: in terminal do </a:t>
+            </a:r>
+            <a:r>
+              <a:rPr lang="en-US" dirty="0">
+                <a:highlight>
+                  <a:srgbClr val="C0C0C0"/>
+                </a:highlight>
+                <a:latin typeface="Fira Code Retina" panose="020B0809050000020004" pitchFamily="49" charset="0"/>
+                <a:ea typeface="Fira Code Retina" panose="020B0809050000020004" pitchFamily="49" charset="0"/>
+              </a:rPr>
+              <a:t>git clone &lt;SSH LINK&gt;</a:t>
+            </a:r>
+            <a:endParaRPr lang="en-US" dirty="0"/>
           </a:p>
         </p:txBody>
       </p:sp>
@@ -13573,7 +13735,14 @@
           <a:p>
             <a:r>
               <a:rPr lang="en-US" dirty="0"/>
-              <a:t>How do I use Git and GitHub with collaborators?</a:t>
+              <a:t>How do I use Git and GitHub with collaborators? </a:t>
+            </a:r>
+            <a:br>
+              <a:rPr lang="en-US" dirty="0"/>
+            </a:br>
+            <a:r>
+              <a:rPr lang="en-US" dirty="0"/>
+              <a:t>(5 min break)</a:t>
             </a:r>
           </a:p>
         </p:txBody>

</xml_diff>

<commit_message>
Created images folder, almost done!
</commit_message>
<xml_diff>
--- a/GitHub for Epidemiologists.pptx
+++ b/GitHub for Epidemiologists.pptx
@@ -5,7 +5,7 @@
     <p:sldMasterId id="2147483660" r:id="rId1"/>
   </p:sldMasterIdLst>
   <p:notesMasterIdLst>
-    <p:notesMasterId r:id="rId26"/>
+    <p:notesMasterId r:id="rId30"/>
   </p:notesMasterIdLst>
   <p:sldIdLst>
     <p:sldId id="256" r:id="rId2"/>
@@ -32,6 +32,10 @@
     <p:sldId id="376" r:id="rId23"/>
     <p:sldId id="363" r:id="rId24"/>
     <p:sldId id="364" r:id="rId25"/>
+    <p:sldId id="382" r:id="rId26"/>
+    <p:sldId id="383" r:id="rId27"/>
+    <p:sldId id="381" r:id="rId28"/>
+    <p:sldId id="379" r:id="rId29"/>
   </p:sldIdLst>
   <p:sldSz cx="12192000" cy="6858000"/>
   <p:notesSz cx="6858000" cy="9144000"/>
@@ -163,6 +167,10 @@
             <p14:sldId id="376"/>
             <p14:sldId id="363"/>
             <p14:sldId id="364"/>
+            <p14:sldId id="382"/>
+            <p14:sldId id="383"/>
+            <p14:sldId id="381"/>
+            <p14:sldId id="379"/>
           </p14:sldIdLst>
         </p14:section>
         <p14:section name="Quote Slides" id="{55772DD4-4220-A841-930F-717988BE6260}">
@@ -281,7 +289,7 @@
           <a:p>
             <a:fld id="{0E4866A7-698B-6A44-88F1-0082A6B9A9EB}" type="datetimeFigureOut">
               <a:rPr lang="en-US" smtClean="0"/>
-              <a:t>3/27/23</a:t>
+              <a:t>3/30/23</a:t>
             </a:fld>
             <a:endParaRPr lang="en-US"/>
           </a:p>
@@ -9357,6 +9365,25 @@
               <a:t>with some Git and some RStudio</a:t>
             </a:r>
           </a:p>
+          <a:p>
+            <a:r>
+              <a:rPr lang="en-US" dirty="0"/>
+              <a:t>See </a:t>
+            </a:r>
+            <a:r>
+              <a:rPr lang="en-US" dirty="0" err="1">
+                <a:hlinkClick r:id="rId3"/>
+              </a:rPr>
+              <a:t>go.unc.edu</a:t>
+            </a:r>
+            <a:r>
+              <a:rPr lang="en-US" dirty="0">
+                <a:hlinkClick r:id="rId3"/>
+              </a:rPr>
+              <a:t>/github4epi</a:t>
+            </a:r>
+            <a:endParaRPr lang="en-US" dirty="0"/>
+          </a:p>
         </p:txBody>
       </p:sp>
       <p:sp>
@@ -10055,8 +10082,8 @@
         </p:nvSpPr>
         <p:spPr>
           <a:xfrm>
-            <a:off x="6501930" y="2476500"/>
-            <a:ext cx="5296780" cy="3265394"/>
+            <a:off x="6498186" y="2206044"/>
+            <a:ext cx="5389416" cy="3265394"/>
           </a:xfrm>
         </p:spPr>
         <p:txBody>
@@ -10093,6 +10120,26 @@
             <a:r>
               <a:rPr lang="en-US" dirty="0"/>
               <a:t>File deltas (change), Commit message, and Commit hash</a:t>
+            </a:r>
+          </a:p>
+          <a:p>
+            <a:r>
+              <a:rPr lang="en-US" dirty="0"/>
+              <a:t>Use </a:t>
+            </a:r>
+            <a:r>
+              <a:rPr lang="en-US" sz="2800" dirty="0">
+                <a:highlight>
+                  <a:srgbClr val="C0C0C0"/>
+                </a:highlight>
+                <a:latin typeface="Fira Code Retina" panose="020B0809050000020004" pitchFamily="49" charset="0"/>
+                <a:ea typeface="Fira Code Retina" panose="020B0809050000020004" pitchFamily="49" charset="0"/>
+              </a:rPr>
+              <a:t>git status</a:t>
+            </a:r>
+            <a:r>
+              <a:rPr lang="en-US" dirty="0"/>
+              <a:t> to see current status</a:t>
             </a:r>
           </a:p>
           <a:p>
@@ -13107,7 +13154,7 @@
                 <a:latin typeface="Fira Code Retina" panose="020B0809050000020004" pitchFamily="49" charset="0"/>
                 <a:ea typeface="Fira Code Retina" panose="020B0809050000020004" pitchFamily="49" charset="0"/>
               </a:rPr>
-              <a:t>git clone &lt;SSH LINK&gt;</a:t>
+              <a:t>git clone SSH_LINK</a:t>
             </a:r>
             <a:endParaRPr lang="en-US" dirty="0"/>
           </a:p>
@@ -13826,7 +13873,10 @@
           <a:bodyPr/>
           <a:lstStyle/>
           <a:p>
-            <a:endParaRPr lang="en-US"/>
+            <a:r>
+              <a:rPr lang="en-US" dirty="0"/>
+              <a:t>GitHub is easy with one person. Many people though….</a:t>
+            </a:r>
           </a:p>
         </p:txBody>
       </p:sp>
@@ -13879,7 +13929,81 @@
           <a:bodyPr/>
           <a:lstStyle/>
           <a:p>
-            <a:endParaRPr lang="en-US"/>
+            <a:r>
+              <a:rPr lang="en-US" dirty="0"/>
+              <a:t>The hidden </a:t>
+            </a:r>
+            <a:r>
+              <a:rPr lang="en-US" dirty="0">
+                <a:latin typeface="Fira Code" panose="020B0809050000020004" pitchFamily="49" charset="0"/>
+                <a:ea typeface="Fira Code" panose="020B0809050000020004" pitchFamily="49" charset="0"/>
+              </a:rPr>
+              <a:t>.git</a:t>
+            </a:r>
+            <a:r>
+              <a:rPr lang="en-US" dirty="0"/>
+              <a:t> repository stores the last commit in GitHub to tack changes onto.</a:t>
+            </a:r>
+          </a:p>
+          <a:p>
+            <a:r>
+              <a:rPr lang="en-US" dirty="0"/>
+              <a:t>If someone else pushes changes to the repository, then when you push changes, you won’t push to the correct place.</a:t>
+            </a:r>
+          </a:p>
+          <a:p>
+            <a:r>
+              <a:rPr lang="en-US" dirty="0"/>
+              <a:t>Sometimes, git is smart, and if there are no conflicts, it may be fine. </a:t>
+            </a:r>
+          </a:p>
+          <a:p>
+            <a:r>
+              <a:rPr lang="en-US" dirty="0"/>
+              <a:t>Other times, you get a “fast forward” issue.</a:t>
+            </a:r>
+          </a:p>
+          <a:p>
+            <a:pPr lvl="1"/>
+            <a:r>
+              <a:rPr lang="en-US" dirty="0"/>
+              <a:t>Simple cases: </a:t>
+            </a:r>
+            <a:r>
+              <a:rPr lang="en-US" dirty="0">
+                <a:highlight>
+                  <a:srgbClr val="C0C0C0"/>
+                </a:highlight>
+                <a:latin typeface="Fira Code Retina" panose="020B0809050000020004" pitchFamily="49" charset="0"/>
+                <a:ea typeface="Fira Code Retina" panose="020B0809050000020004" pitchFamily="49" charset="0"/>
+              </a:rPr>
+              <a:t>git pull</a:t>
+            </a:r>
+            <a:r>
+              <a:rPr lang="en-US" dirty="0"/>
+              <a:t> resolves this.</a:t>
+            </a:r>
+          </a:p>
+          <a:p>
+            <a:pPr lvl="1"/>
+            <a:r>
+              <a:rPr lang="en-US" dirty="0"/>
+              <a:t>Complex cases: </a:t>
+            </a:r>
+            <a:r>
+              <a:rPr lang="en-US" dirty="0">
+                <a:highlight>
+                  <a:srgbClr val="C0C0C0"/>
+                </a:highlight>
+                <a:latin typeface="Fira Code Retina" panose="020B0809050000020004" pitchFamily="49" charset="0"/>
+                <a:ea typeface="Fira Code Retina" panose="020B0809050000020004" pitchFamily="49" charset="0"/>
+              </a:rPr>
+              <a:t>git pull --rebase</a:t>
+            </a:r>
+            <a:r>
+              <a:rPr lang="en-US" dirty="0"/>
+              <a:t> or… copy and paste into Google. Seriously.</a:t>
+            </a:r>
           </a:p>
         </p:txBody>
       </p:sp>
@@ -13917,6 +14041,1024 @@
     <p:extLst>
       <p:ext uri="{BB962C8B-B14F-4D97-AF65-F5344CB8AC3E}">
         <p14:creationId xmlns:p14="http://schemas.microsoft.com/office/powerpoint/2010/main" val="2966552843"/>
+      </p:ext>
+    </p:extLst>
+  </p:cSld>
+  <p:clrMapOvr>
+    <a:masterClrMapping/>
+  </p:clrMapOvr>
+</p:sld>
+</file>
+
+<file path=ppt/slides/slide25.xml><?xml version="1.0" encoding="utf-8"?>
+<p:sld xmlns:a="http://schemas.openxmlformats.org/drawingml/2006/main" xmlns:r="http://schemas.openxmlformats.org/officeDocument/2006/relationships" xmlns:p="http://schemas.openxmlformats.org/presentationml/2006/main">
+  <p:cSld>
+    <p:spTree>
+      <p:nvGrpSpPr>
+        <p:cNvPr id="1" name=""/>
+        <p:cNvGrpSpPr/>
+        <p:nvPr/>
+      </p:nvGrpSpPr>
+      <p:grpSpPr>
+        <a:xfrm>
+          <a:off x="0" y="0"/>
+          <a:ext cx="0" cy="0"/>
+          <a:chOff x="0" y="0"/>
+          <a:chExt cx="0" cy="0"/>
+        </a:xfrm>
+      </p:grpSpPr>
+      <p:sp>
+        <p:nvSpPr>
+          <p:cNvPr id="2" name="Title 1">
+            <a:extLst>
+              <a:ext uri="{FF2B5EF4-FFF2-40B4-BE49-F238E27FC236}">
+                <a16:creationId xmlns:a16="http://schemas.microsoft.com/office/drawing/2014/main" id="{CF6C375A-7DA7-8400-FF44-01557F86C071}"/>
+              </a:ext>
+            </a:extLst>
+          </p:cNvPr>
+          <p:cNvSpPr>
+            <a:spLocks noGrp="1"/>
+          </p:cNvSpPr>
+          <p:nvPr>
+            <p:ph type="title"/>
+          </p:nvPr>
+        </p:nvSpPr>
+        <p:spPr/>
+        <p:txBody>
+          <a:bodyPr/>
+          <a:lstStyle/>
+          <a:p>
+            <a:r>
+              <a:rPr lang="en-US" dirty="0"/>
+              <a:t>Advice: avoid conflicts!!</a:t>
+            </a:r>
+          </a:p>
+        </p:txBody>
+      </p:sp>
+      <p:sp>
+        <p:nvSpPr>
+          <p:cNvPr id="4" name="Content Placeholder 3">
+            <a:extLst>
+              <a:ext uri="{FF2B5EF4-FFF2-40B4-BE49-F238E27FC236}">
+                <a16:creationId xmlns:a16="http://schemas.microsoft.com/office/drawing/2014/main" id="{8E017FB9-04B1-0BFE-E4F8-CCD0D2BC623D}"/>
+              </a:ext>
+            </a:extLst>
+          </p:cNvPr>
+          <p:cNvSpPr>
+            <a:spLocks noGrp="1"/>
+          </p:cNvSpPr>
+          <p:nvPr>
+            <p:ph type="body" sz="quarter" idx="16"/>
+          </p:nvPr>
+        </p:nvSpPr>
+        <p:spPr/>
+        <p:txBody>
+          <a:bodyPr/>
+          <a:lstStyle/>
+          <a:p>
+            <a:r>
+              <a:rPr lang="en-US" dirty="0"/>
+              <a:t>Git with Collaborators</a:t>
+            </a:r>
+          </a:p>
+        </p:txBody>
+      </p:sp>
+      <p:pic>
+        <p:nvPicPr>
+          <p:cNvPr id="10" name="Picture Placeholder 9" descr="Diagram&#10;&#10;Description automatically generated">
+            <a:extLst>
+              <a:ext uri="{FF2B5EF4-FFF2-40B4-BE49-F238E27FC236}">
+                <a16:creationId xmlns:a16="http://schemas.microsoft.com/office/drawing/2014/main" id="{A3782FDC-F573-A699-06CE-A0D3558D5D9B}"/>
+              </a:ext>
+            </a:extLst>
+          </p:cNvPr>
+          <p:cNvPicPr>
+            <a:picLocks noGrp="1" noChangeAspect="1"/>
+          </p:cNvPicPr>
+          <p:nvPr>
+            <p:ph type="pic" sz="quarter" idx="17"/>
+          </p:nvPr>
+        </p:nvPicPr>
+        <p:blipFill rotWithShape="1">
+          <a:blip r:embed="rId2"/>
+          <a:srcRect l="-179" t="-2908" r="39" b="-14181"/>
+          <a:stretch/>
+        </p:blipFill>
+        <p:spPr>
+          <a:xfrm>
+            <a:off x="150829" y="744886"/>
+            <a:ext cx="6049647" cy="4957434"/>
+          </a:xfrm>
+        </p:spPr>
+      </p:pic>
+      <p:sp>
+        <p:nvSpPr>
+          <p:cNvPr id="3" name="Text Placeholder 2">
+            <a:extLst>
+              <a:ext uri="{FF2B5EF4-FFF2-40B4-BE49-F238E27FC236}">
+                <a16:creationId xmlns:a16="http://schemas.microsoft.com/office/drawing/2014/main" id="{0F43F02F-FF54-65B5-02F0-F2B0BB5E5342}"/>
+              </a:ext>
+            </a:extLst>
+          </p:cNvPr>
+          <p:cNvSpPr>
+            <a:spLocks noGrp="1"/>
+          </p:cNvSpPr>
+          <p:nvPr>
+            <p:ph type="body" sz="quarter" idx="11"/>
+          </p:nvPr>
+        </p:nvSpPr>
+        <p:spPr>
+          <a:xfrm>
+            <a:off x="6532411" y="1909407"/>
+            <a:ext cx="5090946" cy="3265394"/>
+          </a:xfrm>
+        </p:spPr>
+        <p:txBody>
+          <a:bodyPr/>
+          <a:lstStyle/>
+          <a:p>
+            <a:r>
+              <a:rPr lang="en-US" dirty="0"/>
+              <a:t>To avoid the pesky pulling issue, you can go work on your own </a:t>
+            </a:r>
+            <a:r>
+              <a:rPr lang="en-US" b="1" dirty="0"/>
+              <a:t>branch</a:t>
+            </a:r>
+            <a:r>
+              <a:rPr lang="en-US" dirty="0"/>
+              <a:t>. </a:t>
+            </a:r>
+          </a:p>
+          <a:p>
+            <a:r>
+              <a:rPr lang="en-US" dirty="0"/>
+              <a:t>Git stores the </a:t>
+            </a:r>
+            <a:r>
+              <a:rPr lang="en-US" b="1" dirty="0"/>
+              <a:t>HEAD</a:t>
+            </a:r>
+            <a:r>
+              <a:rPr lang="en-US" dirty="0"/>
+              <a:t> as a pointer to the branch you work on. </a:t>
+            </a:r>
+          </a:p>
+          <a:p>
+            <a:r>
+              <a:rPr lang="en-US" dirty="0"/>
+              <a:t>The branch points to a commit. </a:t>
+            </a:r>
+          </a:p>
+          <a:p>
+            <a:r>
+              <a:rPr lang="en-US" dirty="0"/>
+              <a:t>There are various philosophies to how many/what types of branches to make. </a:t>
+            </a:r>
+          </a:p>
+          <a:p>
+            <a:r>
+              <a:rPr lang="en-US" dirty="0"/>
+              <a:t>See </a:t>
+            </a:r>
+            <a:r>
+              <a:rPr lang="en-US" dirty="0">
+                <a:hlinkClick r:id="rId3"/>
+              </a:rPr>
+              <a:t>Branches in a Nutshell</a:t>
+            </a:r>
+            <a:endParaRPr lang="en-US" dirty="0"/>
+          </a:p>
+          <a:p>
+            <a:endParaRPr lang="en-US" dirty="0"/>
+          </a:p>
+        </p:txBody>
+      </p:sp>
+      <p:sp>
+        <p:nvSpPr>
+          <p:cNvPr id="6" name="Slide Number Placeholder 5">
+            <a:extLst>
+              <a:ext uri="{FF2B5EF4-FFF2-40B4-BE49-F238E27FC236}">
+                <a16:creationId xmlns:a16="http://schemas.microsoft.com/office/drawing/2014/main" id="{0488424D-E984-7947-AA2C-719C21670FD7}"/>
+              </a:ext>
+            </a:extLst>
+          </p:cNvPr>
+          <p:cNvSpPr>
+            <a:spLocks noGrp="1"/>
+          </p:cNvSpPr>
+          <p:nvPr>
+            <p:ph type="sldNum" sz="quarter" idx="10"/>
+          </p:nvPr>
+        </p:nvSpPr>
+        <p:spPr/>
+        <p:txBody>
+          <a:bodyPr/>
+          <a:lstStyle/>
+          <a:p>
+            <a:fld id="{6D6E361B-DFCA-824D-BA63-ADCED3B41986}" type="slidenum">
+              <a:rPr lang="en-US" smtClean="0"/>
+              <a:pPr/>
+              <a:t>25</a:t>
+            </a:fld>
+            <a:endParaRPr lang="en-US" dirty="0"/>
+          </a:p>
+        </p:txBody>
+      </p:sp>
+    </p:spTree>
+    <p:extLst>
+      <p:ext uri="{BB962C8B-B14F-4D97-AF65-F5344CB8AC3E}">
+        <p14:creationId xmlns:p14="http://schemas.microsoft.com/office/powerpoint/2010/main" val="2747352395"/>
+      </p:ext>
+    </p:extLst>
+  </p:cSld>
+  <p:clrMapOvr>
+    <a:masterClrMapping/>
+  </p:clrMapOvr>
+</p:sld>
+</file>
+
+<file path=ppt/slides/slide26.xml><?xml version="1.0" encoding="utf-8"?>
+<p:sld xmlns:a="http://schemas.openxmlformats.org/drawingml/2006/main" xmlns:r="http://schemas.openxmlformats.org/officeDocument/2006/relationships" xmlns:p="http://schemas.openxmlformats.org/presentationml/2006/main">
+  <p:cSld>
+    <p:spTree>
+      <p:nvGrpSpPr>
+        <p:cNvPr id="1" name=""/>
+        <p:cNvGrpSpPr/>
+        <p:nvPr/>
+      </p:nvGrpSpPr>
+      <p:grpSpPr>
+        <a:xfrm>
+          <a:off x="0" y="0"/>
+          <a:ext cx="0" cy="0"/>
+          <a:chOff x="0" y="0"/>
+          <a:chExt cx="0" cy="0"/>
+        </a:xfrm>
+      </p:grpSpPr>
+      <p:sp>
+        <p:nvSpPr>
+          <p:cNvPr id="2" name="Title 1">
+            <a:extLst>
+              <a:ext uri="{FF2B5EF4-FFF2-40B4-BE49-F238E27FC236}">
+                <a16:creationId xmlns:a16="http://schemas.microsoft.com/office/drawing/2014/main" id="{8FA5CAC6-78A1-CE33-28CB-493B13ABA25C}"/>
+              </a:ext>
+            </a:extLst>
+          </p:cNvPr>
+          <p:cNvSpPr>
+            <a:spLocks noGrp="1"/>
+          </p:cNvSpPr>
+          <p:nvPr>
+            <p:ph type="title"/>
+          </p:nvPr>
+        </p:nvSpPr>
+        <p:spPr/>
+        <p:txBody>
+          <a:bodyPr/>
+          <a:lstStyle/>
+          <a:p>
+            <a:r>
+              <a:rPr lang="en-US" dirty="0"/>
+              <a:t>5-minute exercise: Branching, two ways</a:t>
+            </a:r>
+          </a:p>
+        </p:txBody>
+      </p:sp>
+      <p:sp>
+        <p:nvSpPr>
+          <p:cNvPr id="3" name="Text Placeholder 2">
+            <a:extLst>
+              <a:ext uri="{FF2B5EF4-FFF2-40B4-BE49-F238E27FC236}">
+                <a16:creationId xmlns:a16="http://schemas.microsoft.com/office/drawing/2014/main" id="{0F681F31-7309-1BA9-4517-538F2AA3A621}"/>
+              </a:ext>
+            </a:extLst>
+          </p:cNvPr>
+          <p:cNvSpPr>
+            <a:spLocks noGrp="1"/>
+          </p:cNvSpPr>
+          <p:nvPr>
+            <p:ph type="body" sz="quarter" idx="16"/>
+          </p:nvPr>
+        </p:nvSpPr>
+        <p:spPr/>
+        <p:txBody>
+          <a:bodyPr/>
+          <a:lstStyle/>
+          <a:p>
+            <a:r>
+              <a:rPr lang="en-US" dirty="0"/>
+              <a:t>GIT WITH COLLABORATORS</a:t>
+            </a:r>
+          </a:p>
+        </p:txBody>
+      </p:sp>
+      <p:sp>
+        <p:nvSpPr>
+          <p:cNvPr id="4" name="Content Placeholder 3">
+            <a:extLst>
+              <a:ext uri="{FF2B5EF4-FFF2-40B4-BE49-F238E27FC236}">
+                <a16:creationId xmlns:a16="http://schemas.microsoft.com/office/drawing/2014/main" id="{3E72C23A-8265-3CD1-E92F-0DB7C60793F0}"/>
+              </a:ext>
+            </a:extLst>
+          </p:cNvPr>
+          <p:cNvSpPr>
+            <a:spLocks noGrp="1"/>
+          </p:cNvSpPr>
+          <p:nvPr>
+            <p:ph sz="quarter" idx="15"/>
+          </p:nvPr>
+        </p:nvSpPr>
+        <p:spPr>
+          <a:xfrm>
+            <a:off x="499175" y="2208807"/>
+            <a:ext cx="5418054" cy="3533182"/>
+          </a:xfrm>
+        </p:spPr>
+        <p:txBody>
+          <a:bodyPr/>
+          <a:lstStyle/>
+          <a:p>
+            <a:r>
+              <a:rPr lang="en-US" dirty="0"/>
+              <a:t>RStudio</a:t>
+            </a:r>
+          </a:p>
+          <a:p>
+            <a:pPr lvl="1"/>
+            <a:r>
+              <a:rPr lang="en-US" dirty="0"/>
+              <a:t>In a repository we made today, find the Git panel.</a:t>
+            </a:r>
+          </a:p>
+          <a:p>
+            <a:pPr lvl="1"/>
+            <a:r>
+              <a:rPr lang="en-US" dirty="0"/>
+              <a:t>Click “New Branch” (upper right corner?)</a:t>
+            </a:r>
+          </a:p>
+          <a:p>
+            <a:pPr lvl="1"/>
+            <a:r>
+              <a:rPr lang="en-US" dirty="0"/>
+              <a:t>Enter a branch name.</a:t>
+            </a:r>
+          </a:p>
+          <a:p>
+            <a:pPr lvl="1"/>
+            <a:r>
+              <a:rPr lang="en-US" dirty="0"/>
+              <a:t>Make an R Script, add, commit, and push it to the repository. </a:t>
+            </a:r>
+          </a:p>
+          <a:p>
+            <a:pPr lvl="1"/>
+            <a:r>
+              <a:rPr lang="en-US" dirty="0"/>
+              <a:t>Check GitHub to see results</a:t>
+            </a:r>
+          </a:p>
+          <a:p>
+            <a:pPr lvl="1"/>
+            <a:endParaRPr lang="en-US" dirty="0"/>
+          </a:p>
+        </p:txBody>
+      </p:sp>
+      <p:sp>
+        <p:nvSpPr>
+          <p:cNvPr id="5" name="Content Placeholder 4">
+            <a:extLst>
+              <a:ext uri="{FF2B5EF4-FFF2-40B4-BE49-F238E27FC236}">
+                <a16:creationId xmlns:a16="http://schemas.microsoft.com/office/drawing/2014/main" id="{54428102-12DE-8F66-6E5A-AFA1476038DD}"/>
+              </a:ext>
+            </a:extLst>
+          </p:cNvPr>
+          <p:cNvSpPr>
+            <a:spLocks noGrp="1"/>
+          </p:cNvSpPr>
+          <p:nvPr>
+            <p:ph sz="quarter" idx="14"/>
+          </p:nvPr>
+        </p:nvSpPr>
+        <p:spPr/>
+        <p:txBody>
+          <a:bodyPr/>
+          <a:lstStyle/>
+          <a:p>
+            <a:r>
+              <a:rPr lang="en-US" dirty="0"/>
+              <a:t>Terminal</a:t>
+            </a:r>
+          </a:p>
+          <a:p>
+            <a:pPr lvl="1"/>
+            <a:r>
+              <a:rPr lang="en-US" dirty="0"/>
+              <a:t>Create a branch: </a:t>
+            </a:r>
+          </a:p>
+          <a:p>
+            <a:pPr lvl="2"/>
+            <a:r>
+              <a:rPr lang="en-US" dirty="0">
+                <a:highlight>
+                  <a:srgbClr val="C0C0C0"/>
+                </a:highlight>
+                <a:latin typeface="Fira Code Retina" panose="020B0809050000020004" pitchFamily="49" charset="0"/>
+                <a:ea typeface="Fira Code Retina" panose="020B0809050000020004" pitchFamily="49" charset="0"/>
+              </a:rPr>
+              <a:t>git branch BRANCHNAME</a:t>
+            </a:r>
+          </a:p>
+          <a:p>
+            <a:pPr lvl="1"/>
+            <a:r>
+              <a:rPr lang="en-US" dirty="0"/>
+              <a:t>Move to the new branch: </a:t>
+            </a:r>
+          </a:p>
+          <a:p>
+            <a:pPr lvl="2"/>
+            <a:r>
+              <a:rPr lang="en-US" dirty="0">
+                <a:highlight>
+                  <a:srgbClr val="C0C0C0"/>
+                </a:highlight>
+                <a:latin typeface="Fira Code Retina" panose="020B0809050000020004" pitchFamily="49" charset="0"/>
+                <a:ea typeface="Fira Code Retina" panose="020B0809050000020004" pitchFamily="49" charset="0"/>
+              </a:rPr>
+              <a:t>git checkout BRANCHNAME</a:t>
+            </a:r>
+          </a:p>
+          <a:p>
+            <a:pPr lvl="2"/>
+            <a:r>
+              <a:rPr lang="en-US" dirty="0"/>
+              <a:t>If checking status, note that new branch name used.</a:t>
+            </a:r>
+          </a:p>
+          <a:p>
+            <a:pPr lvl="1"/>
+            <a:r>
+              <a:rPr lang="en-US" dirty="0"/>
+              <a:t>Make an R Script, add, commit, and push it to the repository. </a:t>
+            </a:r>
+          </a:p>
+          <a:p>
+            <a:pPr lvl="1"/>
+            <a:r>
+              <a:rPr lang="en-US" dirty="0"/>
+              <a:t>Check GitHub to see results</a:t>
+            </a:r>
+          </a:p>
+          <a:p>
+            <a:pPr lvl="1"/>
+            <a:endParaRPr lang="en-US" dirty="0">
+              <a:highlight>
+                <a:srgbClr val="C0C0C0"/>
+              </a:highlight>
+              <a:latin typeface="Fira Code Retina" panose="020B0809050000020004" pitchFamily="49" charset="0"/>
+              <a:ea typeface="Fira Code Retina" panose="020B0809050000020004" pitchFamily="49" charset="0"/>
+            </a:endParaRPr>
+          </a:p>
+          <a:p>
+            <a:pPr lvl="2"/>
+            <a:endParaRPr lang="en-US" dirty="0">
+              <a:highlight>
+                <a:srgbClr val="C0C0C0"/>
+              </a:highlight>
+              <a:latin typeface="Fira Code Retina" panose="020B0809050000020004" pitchFamily="49" charset="0"/>
+              <a:ea typeface="Fira Code Retina" panose="020B0809050000020004" pitchFamily="49" charset="0"/>
+            </a:endParaRPr>
+          </a:p>
+          <a:p>
+            <a:pPr lvl="2"/>
+            <a:endParaRPr lang="en-US" dirty="0"/>
+          </a:p>
+          <a:p>
+            <a:pPr lvl="2"/>
+            <a:endParaRPr lang="en-US" dirty="0"/>
+          </a:p>
+          <a:p>
+            <a:pPr lvl="1"/>
+            <a:endParaRPr lang="en-US" dirty="0"/>
+          </a:p>
+          <a:p>
+            <a:pPr lvl="1"/>
+            <a:endParaRPr lang="en-US" dirty="0"/>
+          </a:p>
+        </p:txBody>
+      </p:sp>
+      <p:sp>
+        <p:nvSpPr>
+          <p:cNvPr id="6" name="Slide Number Placeholder 5">
+            <a:extLst>
+              <a:ext uri="{FF2B5EF4-FFF2-40B4-BE49-F238E27FC236}">
+                <a16:creationId xmlns:a16="http://schemas.microsoft.com/office/drawing/2014/main" id="{3ED752A0-B000-B07D-AF29-BE25CF4349C7}"/>
+              </a:ext>
+            </a:extLst>
+          </p:cNvPr>
+          <p:cNvSpPr>
+            <a:spLocks noGrp="1"/>
+          </p:cNvSpPr>
+          <p:nvPr>
+            <p:ph type="sldNum" sz="quarter" idx="10"/>
+          </p:nvPr>
+        </p:nvSpPr>
+        <p:spPr/>
+        <p:txBody>
+          <a:bodyPr/>
+          <a:lstStyle/>
+          <a:p>
+            <a:fld id="{6D6E361B-DFCA-824D-BA63-ADCED3B41986}" type="slidenum">
+              <a:rPr lang="en-US" smtClean="0"/>
+              <a:pPr/>
+              <a:t>26</a:t>
+            </a:fld>
+            <a:endParaRPr lang="en-US" dirty="0"/>
+          </a:p>
+        </p:txBody>
+      </p:sp>
+    </p:spTree>
+    <p:extLst>
+      <p:ext uri="{BB962C8B-B14F-4D97-AF65-F5344CB8AC3E}">
+        <p14:creationId xmlns:p14="http://schemas.microsoft.com/office/powerpoint/2010/main" val="209296379"/>
+      </p:ext>
+    </p:extLst>
+  </p:cSld>
+  <p:clrMapOvr>
+    <a:masterClrMapping/>
+  </p:clrMapOvr>
+</p:sld>
+</file>
+
+<file path=ppt/slides/slide27.xml><?xml version="1.0" encoding="utf-8"?>
+<p:sld xmlns:a="http://schemas.openxmlformats.org/drawingml/2006/main" xmlns:r="http://schemas.openxmlformats.org/officeDocument/2006/relationships" xmlns:p="http://schemas.openxmlformats.org/presentationml/2006/main">
+  <p:cSld>
+    <p:spTree>
+      <p:nvGrpSpPr>
+        <p:cNvPr id="1" name=""/>
+        <p:cNvGrpSpPr/>
+        <p:nvPr/>
+      </p:nvGrpSpPr>
+      <p:grpSpPr>
+        <a:xfrm>
+          <a:off x="0" y="0"/>
+          <a:ext cx="0" cy="0"/>
+          <a:chOff x="0" y="0"/>
+          <a:chExt cx="0" cy="0"/>
+        </a:xfrm>
+      </p:grpSpPr>
+    </p:spTree>
+    <p:extLst>
+      <p:ext uri="{BB962C8B-B14F-4D97-AF65-F5344CB8AC3E}">
+        <p14:creationId xmlns:p14="http://schemas.microsoft.com/office/powerpoint/2010/main" val="586509478"/>
+      </p:ext>
+    </p:extLst>
+  </p:cSld>
+  <p:clrMapOvr>
+    <a:masterClrMapping/>
+  </p:clrMapOvr>
+</p:sld>
+</file>
+
+<file path=ppt/slides/slide28.xml><?xml version="1.0" encoding="utf-8"?>
+<p:sld xmlns:a="http://schemas.openxmlformats.org/drawingml/2006/main" xmlns:r="http://schemas.openxmlformats.org/officeDocument/2006/relationships" xmlns:p="http://schemas.openxmlformats.org/presentationml/2006/main">
+  <p:cSld>
+    <p:spTree>
+      <p:nvGrpSpPr>
+        <p:cNvPr id="1" name=""/>
+        <p:cNvGrpSpPr/>
+        <p:nvPr/>
+      </p:nvGrpSpPr>
+      <p:grpSpPr>
+        <a:xfrm>
+          <a:off x="0" y="0"/>
+          <a:ext cx="0" cy="0"/>
+          <a:chOff x="0" y="0"/>
+          <a:chExt cx="0" cy="0"/>
+        </a:xfrm>
+      </p:grpSpPr>
+      <p:sp>
+        <p:nvSpPr>
+          <p:cNvPr id="2" name="Title 1">
+            <a:extLst>
+              <a:ext uri="{FF2B5EF4-FFF2-40B4-BE49-F238E27FC236}">
+                <a16:creationId xmlns:a16="http://schemas.microsoft.com/office/drawing/2014/main" id="{E5DB6FF4-2726-1E2C-E5F9-378D59FB0283}"/>
+              </a:ext>
+            </a:extLst>
+          </p:cNvPr>
+          <p:cNvSpPr>
+            <a:spLocks noGrp="1"/>
+          </p:cNvSpPr>
+          <p:nvPr>
+            <p:ph type="title"/>
+          </p:nvPr>
+        </p:nvSpPr>
+        <p:spPr/>
+        <p:txBody>
+          <a:bodyPr/>
+          <a:lstStyle/>
+          <a:p>
+            <a:r>
+              <a:rPr lang="en-US" dirty="0"/>
+              <a:t>Fun </a:t>
+            </a:r>
+            <a:r>
+              <a:rPr lang="en-US" dirty="0" err="1"/>
+              <a:t>lil</a:t>
+            </a:r>
+            <a:r>
+              <a:rPr lang="en-US" dirty="0"/>
+              <a:t>’ Git commands that you may find useful:</a:t>
+            </a:r>
+          </a:p>
+        </p:txBody>
+      </p:sp>
+      <p:sp>
+        <p:nvSpPr>
+          <p:cNvPr id="3" name="Text Placeholder 2">
+            <a:extLst>
+              <a:ext uri="{FF2B5EF4-FFF2-40B4-BE49-F238E27FC236}">
+                <a16:creationId xmlns:a16="http://schemas.microsoft.com/office/drawing/2014/main" id="{3783D05F-490B-76E1-CBB9-4051C7405DE8}"/>
+              </a:ext>
+            </a:extLst>
+          </p:cNvPr>
+          <p:cNvSpPr>
+            <a:spLocks noGrp="1"/>
+          </p:cNvSpPr>
+          <p:nvPr>
+            <p:ph type="body" sz="quarter" idx="16"/>
+          </p:nvPr>
+        </p:nvSpPr>
+        <p:spPr/>
+        <p:txBody>
+          <a:bodyPr/>
+          <a:lstStyle/>
+          <a:p>
+            <a:r>
+              <a:rPr lang="en-US" dirty="0"/>
+              <a:t>Git Extras!</a:t>
+            </a:r>
+          </a:p>
+        </p:txBody>
+      </p:sp>
+      <p:sp>
+        <p:nvSpPr>
+          <p:cNvPr id="4" name="Text Placeholder 3">
+            <a:extLst>
+              <a:ext uri="{FF2B5EF4-FFF2-40B4-BE49-F238E27FC236}">
+                <a16:creationId xmlns:a16="http://schemas.microsoft.com/office/drawing/2014/main" id="{D67D4A38-0B00-2685-D8F0-BCA0DC3EBFAB}"/>
+              </a:ext>
+            </a:extLst>
+          </p:cNvPr>
+          <p:cNvSpPr>
+            <a:spLocks noGrp="1"/>
+          </p:cNvSpPr>
+          <p:nvPr>
+            <p:ph type="body" sz="quarter" idx="17"/>
+          </p:nvPr>
+        </p:nvSpPr>
+        <p:spPr/>
+        <p:txBody>
+          <a:bodyPr/>
+          <a:lstStyle/>
+          <a:p>
+            <a:r>
+              <a:rPr lang="en-US" dirty="0"/>
+              <a:t>git </a:t>
+            </a:r>
+            <a:r>
+              <a:rPr lang="en-US" b="1" dirty="0"/>
+              <a:t>tag</a:t>
+            </a:r>
+            <a:r>
+              <a:rPr lang="en-US" dirty="0"/>
+              <a:t>: </a:t>
+            </a:r>
+            <a:r>
+              <a:rPr lang="en-US" dirty="0">
+                <a:hlinkClick r:id="rId2"/>
+              </a:rPr>
+              <a:t>Git SCM</a:t>
+            </a:r>
+            <a:endParaRPr lang="en-US" b="1" dirty="0"/>
+          </a:p>
+        </p:txBody>
+      </p:sp>
+      <p:sp>
+        <p:nvSpPr>
+          <p:cNvPr id="5" name="Text Placeholder 4">
+            <a:extLst>
+              <a:ext uri="{FF2B5EF4-FFF2-40B4-BE49-F238E27FC236}">
+                <a16:creationId xmlns:a16="http://schemas.microsoft.com/office/drawing/2014/main" id="{A025E1E0-97B3-32A1-EFA2-A1E66561265E}"/>
+              </a:ext>
+            </a:extLst>
+          </p:cNvPr>
+          <p:cNvSpPr>
+            <a:spLocks noGrp="1"/>
+          </p:cNvSpPr>
+          <p:nvPr>
+            <p:ph type="body" sz="quarter" idx="18"/>
+          </p:nvPr>
+        </p:nvSpPr>
+        <p:spPr/>
+        <p:txBody>
+          <a:bodyPr/>
+          <a:lstStyle/>
+          <a:p>
+            <a:r>
+              <a:rPr lang="en-US" dirty="0"/>
+              <a:t>git </a:t>
+            </a:r>
+            <a:r>
+              <a:rPr lang="en-US" b="1" dirty="0"/>
+              <a:t>log</a:t>
+            </a:r>
+            <a:r>
+              <a:rPr lang="en-US" dirty="0"/>
+              <a:t>: see all commits you have made</a:t>
+            </a:r>
+            <a:endParaRPr lang="en-US" b="1" dirty="0"/>
+          </a:p>
+        </p:txBody>
+      </p:sp>
+      <p:sp>
+        <p:nvSpPr>
+          <p:cNvPr id="6" name="Text Placeholder 5">
+            <a:extLst>
+              <a:ext uri="{FF2B5EF4-FFF2-40B4-BE49-F238E27FC236}">
+                <a16:creationId xmlns:a16="http://schemas.microsoft.com/office/drawing/2014/main" id="{B45A9A46-2711-B8DE-E536-9F8C47C6152A}"/>
+              </a:ext>
+            </a:extLst>
+          </p:cNvPr>
+          <p:cNvSpPr>
+            <a:spLocks noGrp="1"/>
+          </p:cNvSpPr>
+          <p:nvPr>
+            <p:ph type="body" sz="quarter" idx="19"/>
+          </p:nvPr>
+        </p:nvSpPr>
+        <p:spPr/>
+        <p:txBody>
+          <a:bodyPr/>
+          <a:lstStyle/>
+          <a:p>
+            <a:r>
+              <a:rPr lang="en-US" dirty="0"/>
+              <a:t>git </a:t>
+            </a:r>
+            <a:r>
+              <a:rPr lang="en-US" b="1" dirty="0" err="1"/>
+              <a:t>reflog</a:t>
+            </a:r>
+            <a:r>
+              <a:rPr lang="en-US" dirty="0"/>
+              <a:t>: it’s git </a:t>
+            </a:r>
+            <a:r>
+              <a:rPr lang="en-US" b="1" dirty="0"/>
+              <a:t>log </a:t>
+            </a:r>
+            <a:r>
+              <a:rPr lang="en-US" dirty="0"/>
+              <a:t>but more concise, includes the commit hash in case you need to…</a:t>
+            </a:r>
+            <a:endParaRPr lang="en-US" b="1" dirty="0"/>
+          </a:p>
+        </p:txBody>
+      </p:sp>
+      <p:sp>
+        <p:nvSpPr>
+          <p:cNvPr id="7" name="Text Placeholder 6">
+            <a:extLst>
+              <a:ext uri="{FF2B5EF4-FFF2-40B4-BE49-F238E27FC236}">
+                <a16:creationId xmlns:a16="http://schemas.microsoft.com/office/drawing/2014/main" id="{6AC0607C-2E0F-D8BA-DF0E-3B306F41F4ED}"/>
+              </a:ext>
+            </a:extLst>
+          </p:cNvPr>
+          <p:cNvSpPr>
+            <a:spLocks noGrp="1"/>
+          </p:cNvSpPr>
+          <p:nvPr>
+            <p:ph type="body" sz="quarter" idx="20"/>
+          </p:nvPr>
+        </p:nvSpPr>
+        <p:spPr/>
+        <p:txBody>
+          <a:bodyPr/>
+          <a:lstStyle/>
+          <a:p>
+            <a:r>
+              <a:rPr lang="en-US" dirty="0"/>
+              <a:t>git </a:t>
+            </a:r>
+            <a:r>
+              <a:rPr lang="en-US" b="1" dirty="0"/>
+              <a:t>revert</a:t>
+            </a:r>
+            <a:r>
+              <a:rPr lang="en-US" dirty="0"/>
+              <a:t>: return to a previous commit, by git hash</a:t>
+            </a:r>
+            <a:endParaRPr lang="en-US" b="1" dirty="0"/>
+          </a:p>
+        </p:txBody>
+      </p:sp>
+      <p:sp>
+        <p:nvSpPr>
+          <p:cNvPr id="8" name="Text Placeholder 7">
+            <a:extLst>
+              <a:ext uri="{FF2B5EF4-FFF2-40B4-BE49-F238E27FC236}">
+                <a16:creationId xmlns:a16="http://schemas.microsoft.com/office/drawing/2014/main" id="{D0E5E79B-ADC2-417A-49A5-F7955B221AFD}"/>
+              </a:ext>
+            </a:extLst>
+          </p:cNvPr>
+          <p:cNvSpPr>
+            <a:spLocks noGrp="1"/>
+          </p:cNvSpPr>
+          <p:nvPr>
+            <p:ph type="body" sz="quarter" idx="21"/>
+          </p:nvPr>
+        </p:nvSpPr>
+        <p:spPr/>
+        <p:txBody>
+          <a:bodyPr/>
+          <a:lstStyle/>
+          <a:p>
+            <a:endParaRPr lang="en-US" dirty="0"/>
+          </a:p>
+        </p:txBody>
+      </p:sp>
+      <p:sp>
+        <p:nvSpPr>
+          <p:cNvPr id="9" name="Text Placeholder 8">
+            <a:extLst>
+              <a:ext uri="{FF2B5EF4-FFF2-40B4-BE49-F238E27FC236}">
+                <a16:creationId xmlns:a16="http://schemas.microsoft.com/office/drawing/2014/main" id="{51CE3B38-A6A8-9068-E04C-B219ACEADCB3}"/>
+              </a:ext>
+            </a:extLst>
+          </p:cNvPr>
+          <p:cNvSpPr>
+            <a:spLocks noGrp="1"/>
+          </p:cNvSpPr>
+          <p:nvPr>
+            <p:ph type="body" sz="quarter" idx="22"/>
+          </p:nvPr>
+        </p:nvSpPr>
+        <p:spPr/>
+        <p:txBody>
+          <a:bodyPr/>
+          <a:lstStyle/>
+          <a:p>
+            <a:endParaRPr lang="en-US"/>
+          </a:p>
+        </p:txBody>
+      </p:sp>
+      <p:sp>
+        <p:nvSpPr>
+          <p:cNvPr id="10" name="Text Placeholder 9">
+            <a:extLst>
+              <a:ext uri="{FF2B5EF4-FFF2-40B4-BE49-F238E27FC236}">
+                <a16:creationId xmlns:a16="http://schemas.microsoft.com/office/drawing/2014/main" id="{8AF450E7-EC11-D0ED-834F-A5597E99EC01}"/>
+              </a:ext>
+            </a:extLst>
+          </p:cNvPr>
+          <p:cNvSpPr>
+            <a:spLocks noGrp="1"/>
+          </p:cNvSpPr>
+          <p:nvPr>
+            <p:ph type="body" sz="quarter" idx="23"/>
+          </p:nvPr>
+        </p:nvSpPr>
+        <p:spPr/>
+        <p:txBody>
+          <a:bodyPr/>
+          <a:lstStyle/>
+          <a:p>
+            <a:endParaRPr lang="en-US"/>
+          </a:p>
+        </p:txBody>
+      </p:sp>
+      <p:sp>
+        <p:nvSpPr>
+          <p:cNvPr id="11" name="Text Placeholder 10">
+            <a:extLst>
+              <a:ext uri="{FF2B5EF4-FFF2-40B4-BE49-F238E27FC236}">
+                <a16:creationId xmlns:a16="http://schemas.microsoft.com/office/drawing/2014/main" id="{324BB846-B99C-8394-E101-B6DFEC868DCE}"/>
+              </a:ext>
+            </a:extLst>
+          </p:cNvPr>
+          <p:cNvSpPr>
+            <a:spLocks noGrp="1"/>
+          </p:cNvSpPr>
+          <p:nvPr>
+            <p:ph type="body" sz="quarter" idx="24"/>
+          </p:nvPr>
+        </p:nvSpPr>
+        <p:spPr/>
+        <p:txBody>
+          <a:bodyPr/>
+          <a:lstStyle/>
+          <a:p>
+            <a:endParaRPr lang="en-US"/>
+          </a:p>
+        </p:txBody>
+      </p:sp>
+      <p:sp>
+        <p:nvSpPr>
+          <p:cNvPr id="12" name="Text Placeholder 11">
+            <a:extLst>
+              <a:ext uri="{FF2B5EF4-FFF2-40B4-BE49-F238E27FC236}">
+                <a16:creationId xmlns:a16="http://schemas.microsoft.com/office/drawing/2014/main" id="{4A8F94DC-1DD3-8B1B-CE20-3D82EA3ADDFA}"/>
+              </a:ext>
+            </a:extLst>
+          </p:cNvPr>
+          <p:cNvSpPr>
+            <a:spLocks noGrp="1"/>
+          </p:cNvSpPr>
+          <p:nvPr>
+            <p:ph type="body" sz="quarter" idx="25"/>
+          </p:nvPr>
+        </p:nvSpPr>
+        <p:spPr/>
+        <p:txBody>
+          <a:bodyPr/>
+          <a:lstStyle/>
+          <a:p>
+            <a:r>
+              <a:rPr lang="en-US" dirty="0">
+                <a:hlinkClick r:id="rId3"/>
+              </a:rPr>
+              <a:t>This list of useful commands for a SWE</a:t>
+            </a:r>
+            <a:endParaRPr lang="en-US" dirty="0"/>
+          </a:p>
+        </p:txBody>
+      </p:sp>
+      <p:sp>
+        <p:nvSpPr>
+          <p:cNvPr id="13" name="Text Placeholder 12">
+            <a:extLst>
+              <a:ext uri="{FF2B5EF4-FFF2-40B4-BE49-F238E27FC236}">
+                <a16:creationId xmlns:a16="http://schemas.microsoft.com/office/drawing/2014/main" id="{93E73F0A-26AC-00E2-1291-FB301AA7830F}"/>
+              </a:ext>
+            </a:extLst>
+          </p:cNvPr>
+          <p:cNvSpPr>
+            <a:spLocks noGrp="1"/>
+          </p:cNvSpPr>
+          <p:nvPr>
+            <p:ph type="body" sz="quarter" idx="26"/>
+          </p:nvPr>
+        </p:nvSpPr>
+        <p:spPr/>
+        <p:txBody>
+          <a:bodyPr/>
+          <a:lstStyle/>
+          <a:p>
+            <a:r>
+              <a:rPr lang="en-US" dirty="0">
+                <a:hlinkClick r:id="rId4"/>
+              </a:rPr>
+              <a:t>This blog post</a:t>
+            </a:r>
+            <a:endParaRPr lang="en-US" dirty="0"/>
+          </a:p>
+        </p:txBody>
+      </p:sp>
+      <p:sp>
+        <p:nvSpPr>
+          <p:cNvPr id="14" name="Slide Number Placeholder 13">
+            <a:extLst>
+              <a:ext uri="{FF2B5EF4-FFF2-40B4-BE49-F238E27FC236}">
+                <a16:creationId xmlns:a16="http://schemas.microsoft.com/office/drawing/2014/main" id="{7DBE9E92-28C1-D8AB-FF3C-3E2CA614CAFC}"/>
+              </a:ext>
+            </a:extLst>
+          </p:cNvPr>
+          <p:cNvSpPr>
+            <a:spLocks noGrp="1"/>
+          </p:cNvSpPr>
+          <p:nvPr>
+            <p:ph type="sldNum" sz="quarter" idx="10"/>
+          </p:nvPr>
+        </p:nvSpPr>
+        <p:spPr/>
+        <p:txBody>
+          <a:bodyPr/>
+          <a:lstStyle/>
+          <a:p>
+            <a:fld id="{6D6E361B-DFCA-824D-BA63-ADCED3B41986}" type="slidenum">
+              <a:rPr lang="en-US" smtClean="0"/>
+              <a:pPr/>
+              <a:t>28</a:t>
+            </a:fld>
+            <a:endParaRPr lang="en-US" dirty="0"/>
+          </a:p>
+        </p:txBody>
+      </p:sp>
+    </p:spTree>
+    <p:extLst>
+      <p:ext uri="{BB962C8B-B14F-4D97-AF65-F5344CB8AC3E}">
+        <p14:creationId xmlns:p14="http://schemas.microsoft.com/office/powerpoint/2010/main" val="2149927617"/>
       </p:ext>
     </p:extLst>
   </p:cSld>
@@ -15119,6 +16261,25 @@
               <a:rPr lang="en-US" dirty="0"/>
               <a:t>But, books are long, 2 hours is less long. </a:t>
             </a:r>
+          </a:p>
+          <a:p>
+            <a:r>
+              <a:rPr lang="en-US" dirty="0"/>
+              <a:t>See the GitHub repository at </a:t>
+            </a:r>
+            <a:r>
+              <a:rPr lang="en-US" dirty="0" err="1">
+                <a:hlinkClick r:id="rId3"/>
+              </a:rPr>
+              <a:t>go.unc.edu</a:t>
+            </a:r>
+            <a:r>
+              <a:rPr lang="en-US" dirty="0">
+                <a:hlinkClick r:id="rId3"/>
+              </a:rPr>
+              <a:t>/github4epi</a:t>
+            </a:r>
+            <a:endParaRPr lang="en-US" dirty="0"/>
           </a:p>
         </p:txBody>
       </p:sp>

</xml_diff>

<commit_message>
Fork and Clone slide
</commit_message>
<xml_diff>
--- a/GitHub for Epidemiologists.pptx
+++ b/GitHub for Epidemiologists.pptx
@@ -5,7 +5,7 @@
     <p:sldMasterId id="2147483660" r:id="rId1"/>
   </p:sldMasterIdLst>
   <p:notesMasterIdLst>
-    <p:notesMasterId r:id="rId30"/>
+    <p:notesMasterId r:id="rId32"/>
   </p:notesMasterIdLst>
   <p:sldIdLst>
     <p:sldId id="256" r:id="rId2"/>
@@ -34,8 +34,10 @@
     <p:sldId id="364" r:id="rId25"/>
     <p:sldId id="382" r:id="rId26"/>
     <p:sldId id="383" r:id="rId27"/>
-    <p:sldId id="381" r:id="rId28"/>
-    <p:sldId id="379" r:id="rId29"/>
+    <p:sldId id="384" r:id="rId28"/>
+    <p:sldId id="385" r:id="rId29"/>
+    <p:sldId id="381" r:id="rId30"/>
+    <p:sldId id="379" r:id="rId31"/>
   </p:sldIdLst>
   <p:sldSz cx="12192000" cy="6858000"/>
   <p:notesSz cx="6858000" cy="9144000"/>
@@ -169,6 +171,8 @@
             <p14:sldId id="364"/>
             <p14:sldId id="382"/>
             <p14:sldId id="383"/>
+            <p14:sldId id="384"/>
+            <p14:sldId id="385"/>
             <p14:sldId id="381"/>
             <p14:sldId id="379"/>
           </p14:sldIdLst>
@@ -14607,10 +14611,166 @@
           <a:chExt cx="0" cy="0"/>
         </a:xfrm>
       </p:grpSpPr>
+      <p:sp>
+        <p:nvSpPr>
+          <p:cNvPr id="2" name="Title 1">
+            <a:extLst>
+              <a:ext uri="{FF2B5EF4-FFF2-40B4-BE49-F238E27FC236}">
+                <a16:creationId xmlns:a16="http://schemas.microsoft.com/office/drawing/2014/main" id="{2872684B-ECBA-FB6A-B0B0-2079A71052BE}"/>
+              </a:ext>
+            </a:extLst>
+          </p:cNvPr>
+          <p:cNvSpPr>
+            <a:spLocks noGrp="1"/>
+          </p:cNvSpPr>
+          <p:nvPr>
+            <p:ph type="title"/>
+          </p:nvPr>
+        </p:nvSpPr>
+        <p:spPr/>
+        <p:txBody>
+          <a:bodyPr/>
+          <a:lstStyle/>
+          <a:p>
+            <a:r>
+              <a:rPr lang="en-US" dirty="0"/>
+              <a:t>Combining Branches with Pull Requests</a:t>
+            </a:r>
+          </a:p>
+        </p:txBody>
+      </p:sp>
+      <p:sp>
+        <p:nvSpPr>
+          <p:cNvPr id="3" name="Text Placeholder 2">
+            <a:extLst>
+              <a:ext uri="{FF2B5EF4-FFF2-40B4-BE49-F238E27FC236}">
+                <a16:creationId xmlns:a16="http://schemas.microsoft.com/office/drawing/2014/main" id="{8F021615-1528-E452-EF1A-DD6CCF94C752}"/>
+              </a:ext>
+            </a:extLst>
+          </p:cNvPr>
+          <p:cNvSpPr>
+            <a:spLocks noGrp="1"/>
+          </p:cNvSpPr>
+          <p:nvPr>
+            <p:ph type="body" sz="quarter" idx="16"/>
+          </p:nvPr>
+        </p:nvSpPr>
+        <p:spPr/>
+        <p:txBody>
+          <a:bodyPr/>
+          <a:lstStyle/>
+          <a:p>
+            <a:r>
+              <a:rPr lang="en-US" dirty="0"/>
+              <a:t>Git with Collaborators</a:t>
+            </a:r>
+          </a:p>
+        </p:txBody>
+      </p:sp>
+      <p:sp>
+        <p:nvSpPr>
+          <p:cNvPr id="6" name="Content Placeholder 5">
+            <a:extLst>
+              <a:ext uri="{FF2B5EF4-FFF2-40B4-BE49-F238E27FC236}">
+                <a16:creationId xmlns:a16="http://schemas.microsoft.com/office/drawing/2014/main" id="{6349E404-BC00-3BE8-A791-A75E856AD359}"/>
+              </a:ext>
+            </a:extLst>
+          </p:cNvPr>
+          <p:cNvSpPr>
+            <a:spLocks noGrp="1"/>
+          </p:cNvSpPr>
+          <p:nvPr>
+            <p:ph sz="quarter" idx="15"/>
+          </p:nvPr>
+        </p:nvSpPr>
+        <p:spPr/>
+        <p:txBody>
+          <a:bodyPr/>
+          <a:lstStyle/>
+          <a:p>
+            <a:r>
+              <a:rPr lang="en-US" dirty="0"/>
+              <a:t>To combine your work on </a:t>
+            </a:r>
+            <a:r>
+              <a:rPr lang="en-US" dirty="0">
+                <a:highlight>
+                  <a:srgbClr val="C0C0C0"/>
+                </a:highlight>
+                <a:latin typeface="Fira Code Retina" panose="020B0809050000020004" pitchFamily="49" charset="0"/>
+                <a:ea typeface="Fira Code Retina" panose="020B0809050000020004" pitchFamily="49" charset="0"/>
+              </a:rPr>
+              <a:t>BRANCHNAME</a:t>
+            </a:r>
+            <a:r>
+              <a:rPr lang="en-US" dirty="0"/>
+              <a:t> back into the main repository, you can open a </a:t>
+            </a:r>
+            <a:r>
+              <a:rPr lang="en-US" b="1" dirty="0"/>
+              <a:t>Pull Request </a:t>
+            </a:r>
+            <a:r>
+              <a:rPr lang="en-US" dirty="0"/>
+              <a:t>on GitHub. </a:t>
+            </a:r>
+          </a:p>
+          <a:p>
+            <a:r>
+              <a:rPr lang="en-US" dirty="0"/>
+              <a:t>Point-and-click is the best option in my experience. </a:t>
+            </a:r>
+          </a:p>
+          <a:p>
+            <a:r>
+              <a:rPr lang="en-US" dirty="0"/>
+              <a:t>Merging branches require the same commit history – so no mixing and matching between work of one repository </a:t>
+            </a:r>
+            <a:r>
+              <a:rPr lang="en-US"/>
+              <a:t>and another repository.</a:t>
+            </a:r>
+            <a:endParaRPr lang="en-US" dirty="0"/>
+          </a:p>
+          <a:p>
+            <a:endParaRPr lang="en-US" b="1" dirty="0"/>
+          </a:p>
+        </p:txBody>
+      </p:sp>
+      <p:sp>
+        <p:nvSpPr>
+          <p:cNvPr id="5" name="Slide Number Placeholder 4">
+            <a:extLst>
+              <a:ext uri="{FF2B5EF4-FFF2-40B4-BE49-F238E27FC236}">
+                <a16:creationId xmlns:a16="http://schemas.microsoft.com/office/drawing/2014/main" id="{C37BDCC0-BA32-9E28-87FE-BFFA2297C164}"/>
+              </a:ext>
+            </a:extLst>
+          </p:cNvPr>
+          <p:cNvSpPr>
+            <a:spLocks noGrp="1"/>
+          </p:cNvSpPr>
+          <p:nvPr>
+            <p:ph type="sldNum" sz="quarter" idx="10"/>
+          </p:nvPr>
+        </p:nvSpPr>
+        <p:spPr/>
+        <p:txBody>
+          <a:bodyPr/>
+          <a:lstStyle/>
+          <a:p>
+            <a:fld id="{6D6E361B-DFCA-824D-BA63-ADCED3B41986}" type="slidenum">
+              <a:rPr lang="en-US" smtClean="0"/>
+              <a:pPr/>
+              <a:t>27</a:t>
+            </a:fld>
+            <a:endParaRPr lang="en-US" dirty="0"/>
+          </a:p>
+        </p:txBody>
+      </p:sp>
     </p:spTree>
     <p:extLst>
       <p:ext uri="{BB962C8B-B14F-4D97-AF65-F5344CB8AC3E}">
-        <p14:creationId xmlns:p14="http://schemas.microsoft.com/office/powerpoint/2010/main" val="586509478"/>
+        <p14:creationId xmlns:p14="http://schemas.microsoft.com/office/powerpoint/2010/main" val="591519221"/>
       </p:ext>
     </p:extLst>
   </p:cSld>
@@ -14642,7 +14802,7 @@
           <p:cNvPr id="2" name="Title 1">
             <a:extLst>
               <a:ext uri="{FF2B5EF4-FFF2-40B4-BE49-F238E27FC236}">
-                <a16:creationId xmlns:a16="http://schemas.microsoft.com/office/drawing/2014/main" id="{E5DB6FF4-2726-1E2C-E5F9-378D59FB0283}"/>
+                <a16:creationId xmlns:a16="http://schemas.microsoft.com/office/drawing/2014/main" id="{C77F4AF7-B84E-75F0-07DE-75B7C284AE0D}"/>
               </a:ext>
             </a:extLst>
           </p:cNvPr>
@@ -14660,15 +14820,60 @@
           <a:p>
             <a:r>
               <a:rPr lang="en-US" dirty="0"/>
-              <a:t>Fun </a:t>
-            </a:r>
-            <a:r>
-              <a:rPr lang="en-US" dirty="0" err="1"/>
-              <a:t>lil</a:t>
-            </a:r>
-            <a:r>
-              <a:rPr lang="en-US" dirty="0"/>
-              <a:t>’ Git commands that you may find useful:</a:t>
+              <a:t>Working with “Collaborators”</a:t>
+            </a:r>
+          </a:p>
+        </p:txBody>
+      </p:sp>
+      <p:pic>
+        <p:nvPicPr>
+          <p:cNvPr id="10" name="Picture Placeholder 9" descr="A picture containing timeline&#10;&#10;Description automatically generated">
+            <a:extLst>
+              <a:ext uri="{FF2B5EF4-FFF2-40B4-BE49-F238E27FC236}">
+                <a16:creationId xmlns:a16="http://schemas.microsoft.com/office/drawing/2014/main" id="{4EC5E077-8448-699D-5BA8-DD8F30C4FDA6}"/>
+              </a:ext>
+            </a:extLst>
+          </p:cNvPr>
+          <p:cNvPicPr>
+            <a:picLocks noGrp="1" noChangeAspect="1"/>
+          </p:cNvPicPr>
+          <p:nvPr>
+            <p:ph type="pic" sz="quarter" idx="17"/>
+          </p:nvPr>
+        </p:nvPicPr>
+        <p:blipFill>
+          <a:blip r:embed="rId2"/>
+          <a:srcRect t="1648" b="1648"/>
+          <a:stretch>
+            <a:fillRect/>
+          </a:stretch>
+        </p:blipFill>
+        <p:spPr/>
+      </p:pic>
+      <p:sp>
+        <p:nvSpPr>
+          <p:cNvPr id="7" name="Text Placeholder 6">
+            <a:extLst>
+              <a:ext uri="{FF2B5EF4-FFF2-40B4-BE49-F238E27FC236}">
+                <a16:creationId xmlns:a16="http://schemas.microsoft.com/office/drawing/2014/main" id="{C503E844-8A83-3051-FAFD-3D5A4BA0B3D1}"/>
+              </a:ext>
+            </a:extLst>
+          </p:cNvPr>
+          <p:cNvSpPr>
+            <a:spLocks noGrp="1"/>
+          </p:cNvSpPr>
+          <p:nvPr>
+            <p:ph type="body" sz="quarter" idx="16"/>
+          </p:nvPr>
+        </p:nvSpPr>
+        <p:spPr/>
+        <p:txBody>
+          <a:bodyPr/>
+          <a:lstStyle/>
+          <a:p>
+            <a:r>
+              <a:rPr lang="en-US" dirty="0"/>
+              <a:t>Git with Collaborators</a:t>
             </a:r>
           </a:p>
         </p:txBody>
@@ -14678,15 +14883,15 @@
           <p:cNvPr id="3" name="Text Placeholder 2">
             <a:extLst>
               <a:ext uri="{FF2B5EF4-FFF2-40B4-BE49-F238E27FC236}">
-                <a16:creationId xmlns:a16="http://schemas.microsoft.com/office/drawing/2014/main" id="{3783D05F-490B-76E1-CBB9-4051C7405DE8}"/>
-              </a:ext>
-            </a:extLst>
-          </p:cNvPr>
-          <p:cNvSpPr>
-            <a:spLocks noGrp="1"/>
-          </p:cNvSpPr>
-          <p:nvPr>
-            <p:ph type="body" sz="quarter" idx="16"/>
+                <a16:creationId xmlns:a16="http://schemas.microsoft.com/office/drawing/2014/main" id="{91CA1A01-698A-86AC-D3D0-983FE1BD47BB}"/>
+              </a:ext>
+            </a:extLst>
+          </p:cNvPr>
+          <p:cNvSpPr>
+            <a:spLocks noGrp="1"/>
+          </p:cNvSpPr>
+          <p:nvPr>
+            <p:ph type="body" sz="quarter" idx="11"/>
           </p:nvPr>
         </p:nvSpPr>
         <p:spPr/>
@@ -14696,341 +14901,48 @@
           <a:p>
             <a:r>
               <a:rPr lang="en-US" dirty="0"/>
-              <a:t>Git Extras!</a:t>
-            </a:r>
-          </a:p>
-        </p:txBody>
-      </p:sp>
-      <p:sp>
-        <p:nvSpPr>
-          <p:cNvPr id="4" name="Text Placeholder 3">
-            <a:extLst>
-              <a:ext uri="{FF2B5EF4-FFF2-40B4-BE49-F238E27FC236}">
-                <a16:creationId xmlns:a16="http://schemas.microsoft.com/office/drawing/2014/main" id="{D67D4A38-0B00-2685-D8F0-BCA0DC3EBFAB}"/>
-              </a:ext>
-            </a:extLst>
-          </p:cNvPr>
-          <p:cNvSpPr>
-            <a:spLocks noGrp="1"/>
-          </p:cNvSpPr>
-          <p:nvPr>
-            <p:ph type="body" sz="quarter" idx="17"/>
-          </p:nvPr>
-        </p:nvSpPr>
-        <p:spPr/>
-        <p:txBody>
-          <a:bodyPr/>
-          <a:lstStyle/>
-          <a:p>
-            <a:r>
-              <a:rPr lang="en-US" dirty="0"/>
-              <a:t>git </a:t>
-            </a:r>
-            <a:r>
-              <a:rPr lang="en-US" b="1" dirty="0"/>
-              <a:t>tag</a:t>
-            </a:r>
-            <a:r>
-              <a:rPr lang="en-US" dirty="0"/>
-              <a:t>: </a:t>
-            </a:r>
-            <a:r>
-              <a:rPr lang="en-US" dirty="0">
-                <a:hlinkClick r:id="rId2"/>
-              </a:rPr>
-              <a:t>Git SCM</a:t>
-            </a:r>
-            <a:endParaRPr lang="en-US" b="1" dirty="0"/>
-          </a:p>
-        </p:txBody>
-      </p:sp>
-      <p:sp>
-        <p:nvSpPr>
-          <p:cNvPr id="5" name="Text Placeholder 4">
-            <a:extLst>
-              <a:ext uri="{FF2B5EF4-FFF2-40B4-BE49-F238E27FC236}">
-                <a16:creationId xmlns:a16="http://schemas.microsoft.com/office/drawing/2014/main" id="{A025E1E0-97B3-32A1-EFA2-A1E66561265E}"/>
-              </a:ext>
-            </a:extLst>
-          </p:cNvPr>
-          <p:cNvSpPr>
-            <a:spLocks noGrp="1"/>
-          </p:cNvSpPr>
-          <p:nvPr>
-            <p:ph type="body" sz="quarter" idx="18"/>
-          </p:nvPr>
-        </p:nvSpPr>
-        <p:spPr/>
-        <p:txBody>
-          <a:bodyPr/>
-          <a:lstStyle/>
-          <a:p>
-            <a:r>
-              <a:rPr lang="en-US" dirty="0"/>
-              <a:t>git </a:t>
-            </a:r>
-            <a:r>
-              <a:rPr lang="en-US" b="1" dirty="0"/>
-              <a:t>log</a:t>
-            </a:r>
-            <a:r>
-              <a:rPr lang="en-US" dirty="0"/>
-              <a:t>: see all commits you have made</a:t>
-            </a:r>
-            <a:endParaRPr lang="en-US" b="1" dirty="0"/>
-          </a:p>
-        </p:txBody>
-      </p:sp>
-      <p:sp>
-        <p:nvSpPr>
-          <p:cNvPr id="6" name="Text Placeholder 5">
-            <a:extLst>
-              <a:ext uri="{FF2B5EF4-FFF2-40B4-BE49-F238E27FC236}">
-                <a16:creationId xmlns:a16="http://schemas.microsoft.com/office/drawing/2014/main" id="{B45A9A46-2711-B8DE-E536-9F8C47C6152A}"/>
-              </a:ext>
-            </a:extLst>
-          </p:cNvPr>
-          <p:cNvSpPr>
-            <a:spLocks noGrp="1"/>
-          </p:cNvSpPr>
-          <p:nvPr>
-            <p:ph type="body" sz="quarter" idx="19"/>
-          </p:nvPr>
-        </p:nvSpPr>
-        <p:spPr/>
-        <p:txBody>
-          <a:bodyPr/>
-          <a:lstStyle/>
-          <a:p>
-            <a:r>
-              <a:rPr lang="en-US" dirty="0"/>
-              <a:t>git </a:t>
-            </a:r>
-            <a:r>
-              <a:rPr lang="en-US" b="1" dirty="0" err="1"/>
-              <a:t>reflog</a:t>
-            </a:r>
-            <a:r>
-              <a:rPr lang="en-US" dirty="0"/>
-              <a:t>: it’s git </a:t>
-            </a:r>
-            <a:r>
-              <a:rPr lang="en-US" b="1" dirty="0"/>
-              <a:t>log </a:t>
-            </a:r>
-            <a:r>
-              <a:rPr lang="en-US" dirty="0"/>
-              <a:t>but more concise, includes the commit hash in case you need to…</a:t>
-            </a:r>
-            <a:endParaRPr lang="en-US" b="1" dirty="0"/>
-          </a:p>
-        </p:txBody>
-      </p:sp>
-      <p:sp>
-        <p:nvSpPr>
-          <p:cNvPr id="7" name="Text Placeholder 6">
-            <a:extLst>
-              <a:ext uri="{FF2B5EF4-FFF2-40B4-BE49-F238E27FC236}">
-                <a16:creationId xmlns:a16="http://schemas.microsoft.com/office/drawing/2014/main" id="{6AC0607C-2E0F-D8BA-DF0E-3B306F41F4ED}"/>
-              </a:ext>
-            </a:extLst>
-          </p:cNvPr>
-          <p:cNvSpPr>
-            <a:spLocks noGrp="1"/>
-          </p:cNvSpPr>
-          <p:nvPr>
-            <p:ph type="body" sz="quarter" idx="20"/>
-          </p:nvPr>
-        </p:nvSpPr>
-        <p:spPr/>
-        <p:txBody>
-          <a:bodyPr/>
-          <a:lstStyle/>
-          <a:p>
-            <a:r>
-              <a:rPr lang="en-US" dirty="0"/>
-              <a:t>git </a:t>
-            </a:r>
-            <a:r>
-              <a:rPr lang="en-US" b="1" dirty="0"/>
-              <a:t>revert</a:t>
-            </a:r>
-            <a:r>
-              <a:rPr lang="en-US" dirty="0"/>
-              <a:t>: return to a previous commit, by git hash</a:t>
-            </a:r>
-            <a:endParaRPr lang="en-US" b="1" dirty="0"/>
-          </a:p>
-        </p:txBody>
-      </p:sp>
-      <p:sp>
-        <p:nvSpPr>
-          <p:cNvPr id="8" name="Text Placeholder 7">
-            <a:extLst>
-              <a:ext uri="{FF2B5EF4-FFF2-40B4-BE49-F238E27FC236}">
-                <a16:creationId xmlns:a16="http://schemas.microsoft.com/office/drawing/2014/main" id="{D0E5E79B-ADC2-417A-49A5-F7955B221AFD}"/>
-              </a:ext>
-            </a:extLst>
-          </p:cNvPr>
-          <p:cNvSpPr>
-            <a:spLocks noGrp="1"/>
-          </p:cNvSpPr>
-          <p:nvPr>
-            <p:ph type="body" sz="quarter" idx="21"/>
-          </p:nvPr>
-        </p:nvSpPr>
-        <p:spPr/>
-        <p:txBody>
-          <a:bodyPr/>
-          <a:lstStyle/>
-          <a:p>
-            <a:endParaRPr lang="en-US" dirty="0"/>
-          </a:p>
-        </p:txBody>
-      </p:sp>
-      <p:sp>
-        <p:nvSpPr>
-          <p:cNvPr id="9" name="Text Placeholder 8">
-            <a:extLst>
-              <a:ext uri="{FF2B5EF4-FFF2-40B4-BE49-F238E27FC236}">
-                <a16:creationId xmlns:a16="http://schemas.microsoft.com/office/drawing/2014/main" id="{51CE3B38-A6A8-9068-E04C-B219ACEADCB3}"/>
-              </a:ext>
-            </a:extLst>
-          </p:cNvPr>
-          <p:cNvSpPr>
-            <a:spLocks noGrp="1"/>
-          </p:cNvSpPr>
-          <p:nvPr>
-            <p:ph type="body" sz="quarter" idx="22"/>
-          </p:nvPr>
-        </p:nvSpPr>
-        <p:spPr/>
-        <p:txBody>
-          <a:bodyPr/>
-          <a:lstStyle/>
-          <a:p>
-            <a:endParaRPr lang="en-US"/>
-          </a:p>
-        </p:txBody>
-      </p:sp>
-      <p:sp>
-        <p:nvSpPr>
-          <p:cNvPr id="10" name="Text Placeholder 9">
-            <a:extLst>
-              <a:ext uri="{FF2B5EF4-FFF2-40B4-BE49-F238E27FC236}">
-                <a16:creationId xmlns:a16="http://schemas.microsoft.com/office/drawing/2014/main" id="{8AF450E7-EC11-D0ED-834F-A5597E99EC01}"/>
-              </a:ext>
-            </a:extLst>
-          </p:cNvPr>
-          <p:cNvSpPr>
-            <a:spLocks noGrp="1"/>
-          </p:cNvSpPr>
-          <p:nvPr>
-            <p:ph type="body" sz="quarter" idx="23"/>
-          </p:nvPr>
-        </p:nvSpPr>
-        <p:spPr/>
-        <p:txBody>
-          <a:bodyPr/>
-          <a:lstStyle/>
-          <a:p>
-            <a:endParaRPr lang="en-US"/>
-          </a:p>
-        </p:txBody>
-      </p:sp>
-      <p:sp>
-        <p:nvSpPr>
-          <p:cNvPr id="11" name="Text Placeholder 10">
-            <a:extLst>
-              <a:ext uri="{FF2B5EF4-FFF2-40B4-BE49-F238E27FC236}">
-                <a16:creationId xmlns:a16="http://schemas.microsoft.com/office/drawing/2014/main" id="{324BB846-B99C-8394-E101-B6DFEC868DCE}"/>
-              </a:ext>
-            </a:extLst>
-          </p:cNvPr>
-          <p:cNvSpPr>
-            <a:spLocks noGrp="1"/>
-          </p:cNvSpPr>
-          <p:nvPr>
-            <p:ph type="body" sz="quarter" idx="24"/>
-          </p:nvPr>
-        </p:nvSpPr>
-        <p:spPr/>
-        <p:txBody>
-          <a:bodyPr/>
-          <a:lstStyle/>
-          <a:p>
-            <a:endParaRPr lang="en-US"/>
-          </a:p>
-        </p:txBody>
-      </p:sp>
-      <p:sp>
-        <p:nvSpPr>
-          <p:cNvPr id="12" name="Text Placeholder 11">
-            <a:extLst>
-              <a:ext uri="{FF2B5EF4-FFF2-40B4-BE49-F238E27FC236}">
-                <a16:creationId xmlns:a16="http://schemas.microsoft.com/office/drawing/2014/main" id="{4A8F94DC-1DD3-8B1B-CE20-3D82EA3ADDFA}"/>
-              </a:ext>
-            </a:extLst>
-          </p:cNvPr>
-          <p:cNvSpPr>
-            <a:spLocks noGrp="1"/>
-          </p:cNvSpPr>
-          <p:nvPr>
-            <p:ph type="body" sz="quarter" idx="25"/>
-          </p:nvPr>
-        </p:nvSpPr>
-        <p:spPr/>
-        <p:txBody>
-          <a:bodyPr/>
-          <a:lstStyle/>
-          <a:p>
+              <a:t>Sometimes, there is a codebase which you do not have write-access to, only read-access. </a:t>
+            </a:r>
             <a:r>
               <a:rPr lang="en-US" dirty="0">
                 <a:hlinkClick r:id="rId3"/>
               </a:rPr>
-              <a:t>This list of useful commands for a SWE</a:t>
-            </a:r>
-            <a:endParaRPr lang="en-US" dirty="0"/>
-          </a:p>
-        </p:txBody>
-      </p:sp>
-      <p:sp>
-        <p:nvSpPr>
-          <p:cNvPr id="13" name="Text Placeholder 12">
-            <a:extLst>
-              <a:ext uri="{FF2B5EF4-FFF2-40B4-BE49-F238E27FC236}">
-                <a16:creationId xmlns:a16="http://schemas.microsoft.com/office/drawing/2014/main" id="{93E73F0A-26AC-00E2-1291-FB301AA7830F}"/>
-              </a:ext>
-            </a:extLst>
-          </p:cNvPr>
-          <p:cNvSpPr>
-            <a:spLocks noGrp="1"/>
-          </p:cNvSpPr>
-          <p:nvPr>
-            <p:ph type="body" sz="quarter" idx="26"/>
-          </p:nvPr>
-        </p:nvSpPr>
-        <p:spPr/>
-        <p:txBody>
-          <a:bodyPr/>
-          <a:lstStyle/>
-          <a:p>
-            <a:r>
-              <a:rPr lang="en-US" dirty="0">
-                <a:hlinkClick r:id="rId4"/>
-              </a:rPr>
-              <a:t>This blog post</a:t>
-            </a:r>
-            <a:endParaRPr lang="en-US" dirty="0"/>
-          </a:p>
-        </p:txBody>
-      </p:sp>
-      <p:sp>
-        <p:nvSpPr>
-          <p:cNvPr id="14" name="Slide Number Placeholder 13">
-            <a:extLst>
-              <a:ext uri="{FF2B5EF4-FFF2-40B4-BE49-F238E27FC236}">
-                <a16:creationId xmlns:a16="http://schemas.microsoft.com/office/drawing/2014/main" id="{7DBE9E92-28C1-D8AB-FF3C-3E2CA614CAFC}"/>
+              <a:t>Example</a:t>
+            </a:r>
+            <a:r>
+              <a:rPr lang="en-US" dirty="0"/>
+              <a:t>. </a:t>
+            </a:r>
+          </a:p>
+          <a:p>
+            <a:r>
+              <a:rPr lang="en-US" dirty="0"/>
+              <a:t>To </a:t>
+            </a:r>
+            <a:r>
+              <a:rPr lang="en-US" b="1" dirty="0"/>
+              <a:t>fork </a:t>
+            </a:r>
+            <a:r>
+              <a:rPr lang="en-US" dirty="0"/>
+              <a:t>the repository so you can make changes, you can use: </a:t>
+            </a:r>
+          </a:p>
+          <a:p>
+            <a:pPr lvl="1"/>
+            <a:r>
+              <a:rPr lang="en-US" dirty="0"/>
+              <a:t>GitHub -&gt; point and click in upper right corner (near profile picture). Forked repository allows you to read/write, and then can merge back with Pull Request. </a:t>
+            </a:r>
+          </a:p>
+        </p:txBody>
+      </p:sp>
+      <p:sp>
+        <p:nvSpPr>
+          <p:cNvPr id="5" name="Slide Number Placeholder 4">
+            <a:extLst>
+              <a:ext uri="{FF2B5EF4-FFF2-40B4-BE49-F238E27FC236}">
+                <a16:creationId xmlns:a16="http://schemas.microsoft.com/office/drawing/2014/main" id="{8EA8D5C6-BAB9-922C-CC7A-3807241EFA36}"/>
               </a:ext>
             </a:extLst>
           </p:cNvPr>
@@ -15058,7 +14970,37 @@
     </p:spTree>
     <p:extLst>
       <p:ext uri="{BB962C8B-B14F-4D97-AF65-F5344CB8AC3E}">
-        <p14:creationId xmlns:p14="http://schemas.microsoft.com/office/powerpoint/2010/main" val="2149927617"/>
+        <p14:creationId xmlns:p14="http://schemas.microsoft.com/office/powerpoint/2010/main" val="2569386688"/>
+      </p:ext>
+    </p:extLst>
+  </p:cSld>
+  <p:clrMapOvr>
+    <a:masterClrMapping/>
+  </p:clrMapOvr>
+</p:sld>
+</file>
+
+<file path=ppt/slides/slide29.xml><?xml version="1.0" encoding="utf-8"?>
+<p:sld xmlns:a="http://schemas.openxmlformats.org/drawingml/2006/main" xmlns:r="http://schemas.openxmlformats.org/officeDocument/2006/relationships" xmlns:p="http://schemas.openxmlformats.org/presentationml/2006/main">
+  <p:cSld>
+    <p:spTree>
+      <p:nvGrpSpPr>
+        <p:cNvPr id="1" name=""/>
+        <p:cNvGrpSpPr/>
+        <p:nvPr/>
+      </p:nvGrpSpPr>
+      <p:grpSpPr>
+        <a:xfrm>
+          <a:off x="0" y="0"/>
+          <a:ext cx="0" cy="0"/>
+          <a:chOff x="0" y="0"/>
+          <a:chExt cx="0" cy="0"/>
+        </a:xfrm>
+      </p:grpSpPr>
+    </p:spTree>
+    <p:extLst>
+      <p:ext uri="{BB962C8B-B14F-4D97-AF65-F5344CB8AC3E}">
+        <p14:creationId xmlns:p14="http://schemas.microsoft.com/office/powerpoint/2010/main" val="586509478"/>
       </p:ext>
     </p:extLst>
   </p:cSld>
@@ -15145,6 +15087,454 @@
     <p:extLst>
       <p:ext uri="{BB962C8B-B14F-4D97-AF65-F5344CB8AC3E}">
         <p14:creationId xmlns:p14="http://schemas.microsoft.com/office/powerpoint/2010/main" val="998575831"/>
+      </p:ext>
+    </p:extLst>
+  </p:cSld>
+  <p:clrMapOvr>
+    <a:masterClrMapping/>
+  </p:clrMapOvr>
+</p:sld>
+</file>
+
+<file path=ppt/slides/slide30.xml><?xml version="1.0" encoding="utf-8"?>
+<p:sld xmlns:a="http://schemas.openxmlformats.org/drawingml/2006/main" xmlns:r="http://schemas.openxmlformats.org/officeDocument/2006/relationships" xmlns:p="http://schemas.openxmlformats.org/presentationml/2006/main">
+  <p:cSld>
+    <p:spTree>
+      <p:nvGrpSpPr>
+        <p:cNvPr id="1" name=""/>
+        <p:cNvGrpSpPr/>
+        <p:nvPr/>
+      </p:nvGrpSpPr>
+      <p:grpSpPr>
+        <a:xfrm>
+          <a:off x="0" y="0"/>
+          <a:ext cx="0" cy="0"/>
+          <a:chOff x="0" y="0"/>
+          <a:chExt cx="0" cy="0"/>
+        </a:xfrm>
+      </p:grpSpPr>
+      <p:sp>
+        <p:nvSpPr>
+          <p:cNvPr id="2" name="Title 1">
+            <a:extLst>
+              <a:ext uri="{FF2B5EF4-FFF2-40B4-BE49-F238E27FC236}">
+                <a16:creationId xmlns:a16="http://schemas.microsoft.com/office/drawing/2014/main" id="{E5DB6FF4-2726-1E2C-E5F9-378D59FB0283}"/>
+              </a:ext>
+            </a:extLst>
+          </p:cNvPr>
+          <p:cNvSpPr>
+            <a:spLocks noGrp="1"/>
+          </p:cNvSpPr>
+          <p:nvPr>
+            <p:ph type="title"/>
+          </p:nvPr>
+        </p:nvSpPr>
+        <p:spPr/>
+        <p:txBody>
+          <a:bodyPr/>
+          <a:lstStyle/>
+          <a:p>
+            <a:r>
+              <a:rPr lang="en-US" dirty="0"/>
+              <a:t>Fun </a:t>
+            </a:r>
+            <a:r>
+              <a:rPr lang="en-US" dirty="0" err="1"/>
+              <a:t>lil</a:t>
+            </a:r>
+            <a:r>
+              <a:rPr lang="en-US" dirty="0"/>
+              <a:t>’ Git commands that you may find useful:</a:t>
+            </a:r>
+          </a:p>
+        </p:txBody>
+      </p:sp>
+      <p:sp>
+        <p:nvSpPr>
+          <p:cNvPr id="3" name="Text Placeholder 2">
+            <a:extLst>
+              <a:ext uri="{FF2B5EF4-FFF2-40B4-BE49-F238E27FC236}">
+                <a16:creationId xmlns:a16="http://schemas.microsoft.com/office/drawing/2014/main" id="{3783D05F-490B-76E1-CBB9-4051C7405DE8}"/>
+              </a:ext>
+            </a:extLst>
+          </p:cNvPr>
+          <p:cNvSpPr>
+            <a:spLocks noGrp="1"/>
+          </p:cNvSpPr>
+          <p:nvPr>
+            <p:ph type="body" sz="quarter" idx="16"/>
+          </p:nvPr>
+        </p:nvSpPr>
+        <p:spPr/>
+        <p:txBody>
+          <a:bodyPr/>
+          <a:lstStyle/>
+          <a:p>
+            <a:r>
+              <a:rPr lang="en-US" dirty="0"/>
+              <a:t>Git Extras!</a:t>
+            </a:r>
+          </a:p>
+        </p:txBody>
+      </p:sp>
+      <p:sp>
+        <p:nvSpPr>
+          <p:cNvPr id="4" name="Text Placeholder 3">
+            <a:extLst>
+              <a:ext uri="{FF2B5EF4-FFF2-40B4-BE49-F238E27FC236}">
+                <a16:creationId xmlns:a16="http://schemas.microsoft.com/office/drawing/2014/main" id="{D67D4A38-0B00-2685-D8F0-BCA0DC3EBFAB}"/>
+              </a:ext>
+            </a:extLst>
+          </p:cNvPr>
+          <p:cNvSpPr>
+            <a:spLocks noGrp="1"/>
+          </p:cNvSpPr>
+          <p:nvPr>
+            <p:ph type="body" sz="quarter" idx="17"/>
+          </p:nvPr>
+        </p:nvSpPr>
+        <p:spPr/>
+        <p:txBody>
+          <a:bodyPr/>
+          <a:lstStyle/>
+          <a:p>
+            <a:r>
+              <a:rPr lang="en-US" dirty="0"/>
+              <a:t>git </a:t>
+            </a:r>
+            <a:r>
+              <a:rPr lang="en-US" b="1" dirty="0"/>
+              <a:t>tag</a:t>
+            </a:r>
+            <a:r>
+              <a:rPr lang="en-US" dirty="0"/>
+              <a:t>: </a:t>
+            </a:r>
+            <a:r>
+              <a:rPr lang="en-US" dirty="0">
+                <a:hlinkClick r:id="rId2"/>
+              </a:rPr>
+              <a:t>Git SCM</a:t>
+            </a:r>
+            <a:endParaRPr lang="en-US" b="1" dirty="0"/>
+          </a:p>
+        </p:txBody>
+      </p:sp>
+      <p:sp>
+        <p:nvSpPr>
+          <p:cNvPr id="5" name="Text Placeholder 4">
+            <a:extLst>
+              <a:ext uri="{FF2B5EF4-FFF2-40B4-BE49-F238E27FC236}">
+                <a16:creationId xmlns:a16="http://schemas.microsoft.com/office/drawing/2014/main" id="{A025E1E0-97B3-32A1-EFA2-A1E66561265E}"/>
+              </a:ext>
+            </a:extLst>
+          </p:cNvPr>
+          <p:cNvSpPr>
+            <a:spLocks noGrp="1"/>
+          </p:cNvSpPr>
+          <p:nvPr>
+            <p:ph type="body" sz="quarter" idx="18"/>
+          </p:nvPr>
+        </p:nvSpPr>
+        <p:spPr/>
+        <p:txBody>
+          <a:bodyPr/>
+          <a:lstStyle/>
+          <a:p>
+            <a:r>
+              <a:rPr lang="en-US" dirty="0"/>
+              <a:t>git </a:t>
+            </a:r>
+            <a:r>
+              <a:rPr lang="en-US" b="1" dirty="0"/>
+              <a:t>log</a:t>
+            </a:r>
+            <a:r>
+              <a:rPr lang="en-US" dirty="0"/>
+              <a:t>: see all commits you have made</a:t>
+            </a:r>
+            <a:endParaRPr lang="en-US" b="1" dirty="0"/>
+          </a:p>
+        </p:txBody>
+      </p:sp>
+      <p:sp>
+        <p:nvSpPr>
+          <p:cNvPr id="6" name="Text Placeholder 5">
+            <a:extLst>
+              <a:ext uri="{FF2B5EF4-FFF2-40B4-BE49-F238E27FC236}">
+                <a16:creationId xmlns:a16="http://schemas.microsoft.com/office/drawing/2014/main" id="{B45A9A46-2711-B8DE-E536-9F8C47C6152A}"/>
+              </a:ext>
+            </a:extLst>
+          </p:cNvPr>
+          <p:cNvSpPr>
+            <a:spLocks noGrp="1"/>
+          </p:cNvSpPr>
+          <p:nvPr>
+            <p:ph type="body" sz="quarter" idx="19"/>
+          </p:nvPr>
+        </p:nvSpPr>
+        <p:spPr/>
+        <p:txBody>
+          <a:bodyPr/>
+          <a:lstStyle/>
+          <a:p>
+            <a:r>
+              <a:rPr lang="en-US" dirty="0"/>
+              <a:t>git </a:t>
+            </a:r>
+            <a:r>
+              <a:rPr lang="en-US" b="1" dirty="0" err="1"/>
+              <a:t>reflog</a:t>
+            </a:r>
+            <a:r>
+              <a:rPr lang="en-US" dirty="0"/>
+              <a:t>: it’s git </a:t>
+            </a:r>
+            <a:r>
+              <a:rPr lang="en-US" b="1" dirty="0"/>
+              <a:t>log </a:t>
+            </a:r>
+            <a:r>
+              <a:rPr lang="en-US" dirty="0"/>
+              <a:t>but more concise, includes the commit hash in case you need to…</a:t>
+            </a:r>
+            <a:endParaRPr lang="en-US" b="1" dirty="0"/>
+          </a:p>
+        </p:txBody>
+      </p:sp>
+      <p:sp>
+        <p:nvSpPr>
+          <p:cNvPr id="7" name="Text Placeholder 6">
+            <a:extLst>
+              <a:ext uri="{FF2B5EF4-FFF2-40B4-BE49-F238E27FC236}">
+                <a16:creationId xmlns:a16="http://schemas.microsoft.com/office/drawing/2014/main" id="{6AC0607C-2E0F-D8BA-DF0E-3B306F41F4ED}"/>
+              </a:ext>
+            </a:extLst>
+          </p:cNvPr>
+          <p:cNvSpPr>
+            <a:spLocks noGrp="1"/>
+          </p:cNvSpPr>
+          <p:nvPr>
+            <p:ph type="body" sz="quarter" idx="20"/>
+          </p:nvPr>
+        </p:nvSpPr>
+        <p:spPr/>
+        <p:txBody>
+          <a:bodyPr/>
+          <a:lstStyle/>
+          <a:p>
+            <a:r>
+              <a:rPr lang="en-US" dirty="0"/>
+              <a:t>git </a:t>
+            </a:r>
+            <a:r>
+              <a:rPr lang="en-US" b="1" dirty="0"/>
+              <a:t>revert</a:t>
+            </a:r>
+            <a:r>
+              <a:rPr lang="en-US" dirty="0"/>
+              <a:t>: return to a previous commit, by git hash</a:t>
+            </a:r>
+            <a:endParaRPr lang="en-US" b="1" dirty="0"/>
+          </a:p>
+        </p:txBody>
+      </p:sp>
+      <p:sp>
+        <p:nvSpPr>
+          <p:cNvPr id="8" name="Text Placeholder 7">
+            <a:extLst>
+              <a:ext uri="{FF2B5EF4-FFF2-40B4-BE49-F238E27FC236}">
+                <a16:creationId xmlns:a16="http://schemas.microsoft.com/office/drawing/2014/main" id="{D0E5E79B-ADC2-417A-49A5-F7955B221AFD}"/>
+              </a:ext>
+            </a:extLst>
+          </p:cNvPr>
+          <p:cNvSpPr>
+            <a:spLocks noGrp="1"/>
+          </p:cNvSpPr>
+          <p:nvPr>
+            <p:ph type="body" sz="quarter" idx="21"/>
+          </p:nvPr>
+        </p:nvSpPr>
+        <p:spPr/>
+        <p:txBody>
+          <a:bodyPr/>
+          <a:lstStyle/>
+          <a:p>
+            <a:endParaRPr lang="en-US" dirty="0"/>
+          </a:p>
+        </p:txBody>
+      </p:sp>
+      <p:sp>
+        <p:nvSpPr>
+          <p:cNvPr id="9" name="Text Placeholder 8">
+            <a:extLst>
+              <a:ext uri="{FF2B5EF4-FFF2-40B4-BE49-F238E27FC236}">
+                <a16:creationId xmlns:a16="http://schemas.microsoft.com/office/drawing/2014/main" id="{51CE3B38-A6A8-9068-E04C-B219ACEADCB3}"/>
+              </a:ext>
+            </a:extLst>
+          </p:cNvPr>
+          <p:cNvSpPr>
+            <a:spLocks noGrp="1"/>
+          </p:cNvSpPr>
+          <p:nvPr>
+            <p:ph type="body" sz="quarter" idx="22"/>
+          </p:nvPr>
+        </p:nvSpPr>
+        <p:spPr/>
+        <p:txBody>
+          <a:bodyPr/>
+          <a:lstStyle/>
+          <a:p>
+            <a:endParaRPr lang="en-US"/>
+          </a:p>
+        </p:txBody>
+      </p:sp>
+      <p:sp>
+        <p:nvSpPr>
+          <p:cNvPr id="10" name="Text Placeholder 9">
+            <a:extLst>
+              <a:ext uri="{FF2B5EF4-FFF2-40B4-BE49-F238E27FC236}">
+                <a16:creationId xmlns:a16="http://schemas.microsoft.com/office/drawing/2014/main" id="{8AF450E7-EC11-D0ED-834F-A5597E99EC01}"/>
+              </a:ext>
+            </a:extLst>
+          </p:cNvPr>
+          <p:cNvSpPr>
+            <a:spLocks noGrp="1"/>
+          </p:cNvSpPr>
+          <p:nvPr>
+            <p:ph type="body" sz="quarter" idx="23"/>
+          </p:nvPr>
+        </p:nvSpPr>
+        <p:spPr/>
+        <p:txBody>
+          <a:bodyPr/>
+          <a:lstStyle/>
+          <a:p>
+            <a:endParaRPr lang="en-US"/>
+          </a:p>
+        </p:txBody>
+      </p:sp>
+      <p:sp>
+        <p:nvSpPr>
+          <p:cNvPr id="11" name="Text Placeholder 10">
+            <a:extLst>
+              <a:ext uri="{FF2B5EF4-FFF2-40B4-BE49-F238E27FC236}">
+                <a16:creationId xmlns:a16="http://schemas.microsoft.com/office/drawing/2014/main" id="{324BB846-B99C-8394-E101-B6DFEC868DCE}"/>
+              </a:ext>
+            </a:extLst>
+          </p:cNvPr>
+          <p:cNvSpPr>
+            <a:spLocks noGrp="1"/>
+          </p:cNvSpPr>
+          <p:nvPr>
+            <p:ph type="body" sz="quarter" idx="24"/>
+          </p:nvPr>
+        </p:nvSpPr>
+        <p:spPr/>
+        <p:txBody>
+          <a:bodyPr/>
+          <a:lstStyle/>
+          <a:p>
+            <a:endParaRPr lang="en-US"/>
+          </a:p>
+        </p:txBody>
+      </p:sp>
+      <p:sp>
+        <p:nvSpPr>
+          <p:cNvPr id="12" name="Text Placeholder 11">
+            <a:extLst>
+              <a:ext uri="{FF2B5EF4-FFF2-40B4-BE49-F238E27FC236}">
+                <a16:creationId xmlns:a16="http://schemas.microsoft.com/office/drawing/2014/main" id="{4A8F94DC-1DD3-8B1B-CE20-3D82EA3ADDFA}"/>
+              </a:ext>
+            </a:extLst>
+          </p:cNvPr>
+          <p:cNvSpPr>
+            <a:spLocks noGrp="1"/>
+          </p:cNvSpPr>
+          <p:nvPr>
+            <p:ph type="body" sz="quarter" idx="25"/>
+          </p:nvPr>
+        </p:nvSpPr>
+        <p:spPr/>
+        <p:txBody>
+          <a:bodyPr/>
+          <a:lstStyle/>
+          <a:p>
+            <a:r>
+              <a:rPr lang="en-US" dirty="0">
+                <a:hlinkClick r:id="rId3"/>
+              </a:rPr>
+              <a:t>This list of useful commands for a SWE</a:t>
+            </a:r>
+            <a:endParaRPr lang="en-US" dirty="0"/>
+          </a:p>
+        </p:txBody>
+      </p:sp>
+      <p:sp>
+        <p:nvSpPr>
+          <p:cNvPr id="13" name="Text Placeholder 12">
+            <a:extLst>
+              <a:ext uri="{FF2B5EF4-FFF2-40B4-BE49-F238E27FC236}">
+                <a16:creationId xmlns:a16="http://schemas.microsoft.com/office/drawing/2014/main" id="{93E73F0A-26AC-00E2-1291-FB301AA7830F}"/>
+              </a:ext>
+            </a:extLst>
+          </p:cNvPr>
+          <p:cNvSpPr>
+            <a:spLocks noGrp="1"/>
+          </p:cNvSpPr>
+          <p:nvPr>
+            <p:ph type="body" sz="quarter" idx="26"/>
+          </p:nvPr>
+        </p:nvSpPr>
+        <p:spPr/>
+        <p:txBody>
+          <a:bodyPr/>
+          <a:lstStyle/>
+          <a:p>
+            <a:r>
+              <a:rPr lang="en-US" dirty="0">
+                <a:hlinkClick r:id="rId4"/>
+              </a:rPr>
+              <a:t>This blog post</a:t>
+            </a:r>
+            <a:endParaRPr lang="en-US" dirty="0"/>
+          </a:p>
+        </p:txBody>
+      </p:sp>
+      <p:sp>
+        <p:nvSpPr>
+          <p:cNvPr id="14" name="Slide Number Placeholder 13">
+            <a:extLst>
+              <a:ext uri="{FF2B5EF4-FFF2-40B4-BE49-F238E27FC236}">
+                <a16:creationId xmlns:a16="http://schemas.microsoft.com/office/drawing/2014/main" id="{7DBE9E92-28C1-D8AB-FF3C-3E2CA614CAFC}"/>
+              </a:ext>
+            </a:extLst>
+          </p:cNvPr>
+          <p:cNvSpPr>
+            <a:spLocks noGrp="1"/>
+          </p:cNvSpPr>
+          <p:nvPr>
+            <p:ph type="sldNum" sz="quarter" idx="10"/>
+          </p:nvPr>
+        </p:nvSpPr>
+        <p:spPr/>
+        <p:txBody>
+          <a:bodyPr/>
+          <a:lstStyle/>
+          <a:p>
+            <a:fld id="{6D6E361B-DFCA-824D-BA63-ADCED3B41986}" type="slidenum">
+              <a:rPr lang="en-US" smtClean="0"/>
+              <a:pPr/>
+              <a:t>30</a:t>
+            </a:fld>
+            <a:endParaRPr lang="en-US" dirty="0"/>
+          </a:p>
+        </p:txBody>
+      </p:sp>
+    </p:spTree>
+    <p:extLst>
+      <p:ext uri="{BB962C8B-B14F-4D97-AF65-F5344CB8AC3E}">
+        <p14:creationId xmlns:p14="http://schemas.microsoft.com/office/powerpoint/2010/main" val="2149927617"/>
       </p:ext>
     </p:extLst>
   </p:cSld>

</xml_diff>